<commit_message>
Added Lesson_20200914_0_ProjectRSPImageRobot_Review/Lesson_20200914_0_ProjectRSPImageRobot_Review Updated several documents
</commit_message>
<xml_diff>
--- a/LAB_20200530_0_HandSignRecognition/process_of_machine_learning_for_LAB20200724_0/process_of_machine_learning_for_LAB20200530(traditional_Chinese).pptx
+++ b/LAB_20200530_0_HandSignRecognition/process_of_machine_learning_for_LAB20200724_0/process_of_machine_learning_for_LAB20200530(traditional_Chinese).pptx
@@ -8,6 +8,9 @@
     <p:sldId id="259" r:id="rId2"/>
     <p:sldId id="257" r:id="rId3"/>
     <p:sldId id="258" r:id="rId4"/>
+    <p:sldId id="260" r:id="rId5"/>
+    <p:sldId id="263" r:id="rId6"/>
+    <p:sldId id="261" r:id="rId7"/>
   </p:sldIdLst>
   <p:sldSz cx="12192000" cy="6858000"/>
   <p:notesSz cx="6858000" cy="9144000"/>
@@ -106,7 +109,314 @@
       </a:defRPr>
     </a:lvl9pPr>
   </p:defaultTextStyle>
+  <p:extLst>
+    <p:ext uri="{EFAFB233-063F-42B5-8137-9DF3F51BA10A}">
+      <p15:sldGuideLst xmlns:p15="http://schemas.microsoft.com/office/powerpoint/2012/main"/>
+    </p:ext>
+  </p:extLst>
 </p:presentation>
+</file>
+
+<file path=ppt/revisionInfo.xml><?xml version="1.0" encoding="utf-8"?>
+<p1510:revInfo xmlns:a="http://schemas.openxmlformats.org/drawingml/2006/main" xmlns:r="http://schemas.openxmlformats.org/officeDocument/2006/relationships" xmlns:p1510="http://schemas.microsoft.com/office/powerpoint/2015/10/main">
+  <p1510:revLst>
+    <p1510:client id="{4C338B32-0D6F-4D56-8C28-74259C5E45EC}" v="195" dt="2020-09-20T05:17:25.664"/>
+  </p1510:revLst>
+</p1510:revInfo>
+</file>
+
+<file path=ppt/changesInfos/changesInfo1.xml><?xml version="1.0" encoding="utf-8"?>
+<pc:chgInfo xmlns:a="http://schemas.openxmlformats.org/drawingml/2006/main" xmlns:r="http://schemas.openxmlformats.org/officeDocument/2006/relationships" xmlns:ac="http://schemas.microsoft.com/office/drawing/2013/main/command" xmlns:pc="http://schemas.microsoft.com/office/powerpoint/2013/main/command">
+  <pc:docChgLst>
+    <pc:chgData name="tien-i Kao" userId="a59c1bdb761853cd" providerId="LiveId" clId="{4C338B32-0D6F-4D56-8C28-74259C5E45EC}"/>
+    <pc:docChg chg="undo custSel addSld delSld modSld sldOrd">
+      <pc:chgData name="tien-i Kao" userId="a59c1bdb761853cd" providerId="LiveId" clId="{4C338B32-0D6F-4D56-8C28-74259C5E45EC}" dt="2020-09-20T05:17:40.276" v="2080" actId="1076"/>
+      <pc:docMkLst>
+        <pc:docMk/>
+      </pc:docMkLst>
+      <pc:sldChg chg="addSp delSp modSp mod">
+        <pc:chgData name="tien-i Kao" userId="a59c1bdb761853cd" providerId="LiveId" clId="{4C338B32-0D6F-4D56-8C28-74259C5E45EC}" dt="2020-09-17T08:38:15.147" v="1036" actId="20577"/>
+        <pc:sldMkLst>
+          <pc:docMk/>
+          <pc:sldMk cId="1397110919" sldId="257"/>
+        </pc:sldMkLst>
+        <pc:spChg chg="mod">
+          <ac:chgData name="tien-i Kao" userId="a59c1bdb761853cd" providerId="LiveId" clId="{4C338B32-0D6F-4D56-8C28-74259C5E45EC}" dt="2020-09-17T08:38:15.147" v="1036" actId="20577"/>
+          <ac:spMkLst>
+            <pc:docMk/>
+            <pc:sldMk cId="1397110919" sldId="257"/>
+            <ac:spMk id="2" creationId="{00000000-0000-0000-0000-000000000000}"/>
+          </ac:spMkLst>
+        </pc:spChg>
+        <pc:spChg chg="del">
+          <ac:chgData name="tien-i Kao" userId="a59c1bdb761853cd" providerId="LiveId" clId="{4C338B32-0D6F-4D56-8C28-74259C5E45EC}" dt="2020-09-17T07:47:48.597" v="0" actId="478"/>
+          <ac:spMkLst>
+            <pc:docMk/>
+            <pc:sldMk cId="1397110919" sldId="257"/>
+            <ac:spMk id="3" creationId="{00000000-0000-0000-0000-000000000000}"/>
+          </ac:spMkLst>
+        </pc:spChg>
+        <pc:spChg chg="add mod">
+          <ac:chgData name="tien-i Kao" userId="a59c1bdb761853cd" providerId="LiveId" clId="{4C338B32-0D6F-4D56-8C28-74259C5E45EC}" dt="2020-09-17T07:57:24.592" v="208" actId="1076"/>
+          <ac:spMkLst>
+            <pc:docMk/>
+            <pc:sldMk cId="1397110919" sldId="257"/>
+            <ac:spMk id="4" creationId="{6BF70379-AB66-4497-8D45-BBC6D1039A5D}"/>
+          </ac:spMkLst>
+        </pc:spChg>
+        <pc:picChg chg="add mod">
+          <ac:chgData name="tien-i Kao" userId="a59c1bdb761853cd" providerId="LiveId" clId="{4C338B32-0D6F-4D56-8C28-74259C5E45EC}" dt="2020-09-17T07:57:27.159" v="209" actId="1076"/>
+          <ac:picMkLst>
+            <pc:docMk/>
+            <pc:sldMk cId="1397110919" sldId="257"/>
+            <ac:picMk id="6" creationId="{4CE93213-B3F2-4A91-82B5-E7AC3ECD5F75}"/>
+          </ac:picMkLst>
+        </pc:picChg>
+      </pc:sldChg>
+      <pc:sldChg chg="addSp delSp modSp mod">
+        <pc:chgData name="tien-i Kao" userId="a59c1bdb761853cd" providerId="LiveId" clId="{4C338B32-0D6F-4D56-8C28-74259C5E45EC}" dt="2020-09-19T07:58:01.486" v="1505" actId="20577"/>
+        <pc:sldMkLst>
+          <pc:docMk/>
+          <pc:sldMk cId="2784538604" sldId="258"/>
+        </pc:sldMkLst>
+        <pc:spChg chg="mod">
+          <ac:chgData name="tien-i Kao" userId="a59c1bdb761853cd" providerId="LiveId" clId="{4C338B32-0D6F-4D56-8C28-74259C5E45EC}" dt="2020-09-17T08:37:03.005" v="918" actId="20577"/>
+          <ac:spMkLst>
+            <pc:docMk/>
+            <pc:sldMk cId="2784538604" sldId="258"/>
+            <ac:spMk id="2" creationId="{00000000-0000-0000-0000-000000000000}"/>
+          </ac:spMkLst>
+        </pc:spChg>
+        <pc:spChg chg="del">
+          <ac:chgData name="tien-i Kao" userId="a59c1bdb761853cd" providerId="LiveId" clId="{4C338B32-0D6F-4D56-8C28-74259C5E45EC}" dt="2020-09-17T07:59:22.093" v="231" actId="478"/>
+          <ac:spMkLst>
+            <pc:docMk/>
+            <pc:sldMk cId="2784538604" sldId="258"/>
+            <ac:spMk id="3" creationId="{00000000-0000-0000-0000-000000000000}"/>
+          </ac:spMkLst>
+        </pc:spChg>
+        <pc:spChg chg="add del mod">
+          <ac:chgData name="tien-i Kao" userId="a59c1bdb761853cd" providerId="LiveId" clId="{4C338B32-0D6F-4D56-8C28-74259C5E45EC}" dt="2020-09-17T08:11:24.433" v="246" actId="767"/>
+          <ac:spMkLst>
+            <pc:docMk/>
+            <pc:sldMk cId="2784538604" sldId="258"/>
+            <ac:spMk id="4" creationId="{B36E1F12-4B73-4026-A734-18469D9D77FE}"/>
+          </ac:spMkLst>
+        </pc:spChg>
+        <pc:spChg chg="add del mod">
+          <ac:chgData name="tien-i Kao" userId="a59c1bdb761853cd" providerId="LiveId" clId="{4C338B32-0D6F-4D56-8C28-74259C5E45EC}" dt="2020-09-17T08:19:29.307" v="745" actId="478"/>
+          <ac:spMkLst>
+            <pc:docMk/>
+            <pc:sldMk cId="2784538604" sldId="258"/>
+            <ac:spMk id="5" creationId="{D6FAEA3A-B832-45E3-9E62-526005B52838}"/>
+          </ac:spMkLst>
+        </pc:spChg>
+        <pc:spChg chg="add mod">
+          <ac:chgData name="tien-i Kao" userId="a59c1bdb761853cd" providerId="LiveId" clId="{4C338B32-0D6F-4D56-8C28-74259C5E45EC}" dt="2020-09-19T07:58:01.486" v="1505" actId="20577"/>
+          <ac:spMkLst>
+            <pc:docMk/>
+            <pc:sldMk cId="2784538604" sldId="258"/>
+            <ac:spMk id="6" creationId="{9D1E8FAB-1B1F-4703-A634-9C5D2D555647}"/>
+          </ac:spMkLst>
+        </pc:spChg>
+        <pc:picChg chg="add del mod">
+          <ac:chgData name="tien-i Kao" userId="a59c1bdb761853cd" providerId="LiveId" clId="{4C338B32-0D6F-4D56-8C28-74259C5E45EC}" dt="2020-09-17T08:21:23.721" v="861" actId="478"/>
+          <ac:picMkLst>
+            <pc:docMk/>
+            <pc:sldMk cId="2784538604" sldId="258"/>
+            <ac:picMk id="8" creationId="{2F9A601D-7548-4D9D-B17B-459FD552E325}"/>
+          </ac:picMkLst>
+        </pc:picChg>
+      </pc:sldChg>
+      <pc:sldChg chg="modSp mod">
+        <pc:chgData name="tien-i Kao" userId="a59c1bdb761853cd" providerId="LiveId" clId="{4C338B32-0D6F-4D56-8C28-74259C5E45EC}" dt="2020-09-20T05:09:13.832" v="1830"/>
+        <pc:sldMkLst>
+          <pc:docMk/>
+          <pc:sldMk cId="2136208906" sldId="259"/>
+        </pc:sldMkLst>
+        <pc:spChg chg="mod">
+          <ac:chgData name="tien-i Kao" userId="a59c1bdb761853cd" providerId="LiveId" clId="{4C338B32-0D6F-4D56-8C28-74259C5E45EC}" dt="2020-09-20T05:09:13.832" v="1830"/>
+          <ac:spMkLst>
+            <pc:docMk/>
+            <pc:sldMk cId="2136208906" sldId="259"/>
+            <ac:spMk id="9" creationId="{00000000-0000-0000-0000-000000000000}"/>
+          </ac:spMkLst>
+        </pc:spChg>
+      </pc:sldChg>
+      <pc:sldChg chg="addSp delSp modSp new mod">
+        <pc:chgData name="tien-i Kao" userId="a59c1bdb761853cd" providerId="LiveId" clId="{4C338B32-0D6F-4D56-8C28-74259C5E45EC}" dt="2020-09-20T05:08:09.746" v="1792" actId="20577"/>
+        <pc:sldMkLst>
+          <pc:docMk/>
+          <pc:sldMk cId="3372900583" sldId="260"/>
+        </pc:sldMkLst>
+        <pc:spChg chg="mod">
+          <ac:chgData name="tien-i Kao" userId="a59c1bdb761853cd" providerId="LiveId" clId="{4C338B32-0D6F-4D56-8C28-74259C5E45EC}" dt="2020-09-17T08:38:21.707" v="1037"/>
+          <ac:spMkLst>
+            <pc:docMk/>
+            <pc:sldMk cId="3372900583" sldId="260"/>
+            <ac:spMk id="2" creationId="{3F3962B0-67E2-47A0-9544-1352F5A01920}"/>
+          </ac:spMkLst>
+        </pc:spChg>
+        <pc:spChg chg="del">
+          <ac:chgData name="tien-i Kao" userId="a59c1bdb761853cd" providerId="LiveId" clId="{4C338B32-0D6F-4D56-8C28-74259C5E45EC}" dt="2020-09-17T08:43:04.047" v="1040" actId="478"/>
+          <ac:spMkLst>
+            <pc:docMk/>
+            <pc:sldMk cId="3372900583" sldId="260"/>
+            <ac:spMk id="3" creationId="{D5A30E68-BB39-4F59-8F16-E1390B9E135E}"/>
+          </ac:spMkLst>
+        </pc:spChg>
+        <pc:spChg chg="add del mod">
+          <ac:chgData name="tien-i Kao" userId="a59c1bdb761853cd" providerId="LiveId" clId="{4C338B32-0D6F-4D56-8C28-74259C5E45EC}" dt="2020-09-17T08:50:07.779" v="1338" actId="478"/>
+          <ac:spMkLst>
+            <pc:docMk/>
+            <pc:sldMk cId="3372900583" sldId="260"/>
+            <ac:spMk id="4" creationId="{26D1413C-04AB-4A56-857C-927D8AC5628C}"/>
+          </ac:spMkLst>
+        </pc:spChg>
+        <pc:spChg chg="add mod">
+          <ac:chgData name="tien-i Kao" userId="a59c1bdb761853cd" providerId="LiveId" clId="{4C338B32-0D6F-4D56-8C28-74259C5E45EC}" dt="2020-09-20T05:08:09.746" v="1792" actId="20577"/>
+          <ac:spMkLst>
+            <pc:docMk/>
+            <pc:sldMk cId="3372900583" sldId="260"/>
+            <ac:spMk id="6" creationId="{1F1BDA3B-4AFF-43DE-9132-9B447E51B2FC}"/>
+          </ac:spMkLst>
+        </pc:spChg>
+      </pc:sldChg>
+      <pc:sldChg chg="addSp delSp modSp new mod ord">
+        <pc:chgData name="tien-i Kao" userId="a59c1bdb761853cd" providerId="LiveId" clId="{4C338B32-0D6F-4D56-8C28-74259C5E45EC}" dt="2020-09-20T05:17:40.276" v="2080" actId="1076"/>
+        <pc:sldMkLst>
+          <pc:docMk/>
+          <pc:sldMk cId="1996978805" sldId="261"/>
+        </pc:sldMkLst>
+        <pc:spChg chg="mod">
+          <ac:chgData name="tien-i Kao" userId="a59c1bdb761853cd" providerId="LiveId" clId="{4C338B32-0D6F-4D56-8C28-74259C5E45EC}" dt="2020-09-20T05:15:44.500" v="2024" actId="20577"/>
+          <ac:spMkLst>
+            <pc:docMk/>
+            <pc:sldMk cId="1996978805" sldId="261"/>
+            <ac:spMk id="2" creationId="{0BF839FF-D4EB-4B94-B8F1-1C9E89718F5C}"/>
+          </ac:spMkLst>
+        </pc:spChg>
+        <pc:spChg chg="del mod">
+          <ac:chgData name="tien-i Kao" userId="a59c1bdb761853cd" providerId="LiveId" clId="{4C338B32-0D6F-4D56-8C28-74259C5E45EC}" dt="2020-09-20T05:11:34.787" v="1894" actId="478"/>
+          <ac:spMkLst>
+            <pc:docMk/>
+            <pc:sldMk cId="1996978805" sldId="261"/>
+            <ac:spMk id="3" creationId="{90BA72A2-8C20-4B22-9BF7-6745B0569E99}"/>
+          </ac:spMkLst>
+        </pc:spChg>
+        <pc:spChg chg="add mod">
+          <ac:chgData name="tien-i Kao" userId="a59c1bdb761853cd" providerId="LiveId" clId="{4C338B32-0D6F-4D56-8C28-74259C5E45EC}" dt="2020-09-20T05:17:40.276" v="2080" actId="1076"/>
+          <ac:spMkLst>
+            <pc:docMk/>
+            <pc:sldMk cId="1996978805" sldId="261"/>
+            <ac:spMk id="6" creationId="{AF32F072-1BFD-4D82-A5CC-91DAB66F679A}"/>
+          </ac:spMkLst>
+        </pc:spChg>
+        <pc:spChg chg="add del mod">
+          <ac:chgData name="tien-i Kao" userId="a59c1bdb761853cd" providerId="LiveId" clId="{4C338B32-0D6F-4D56-8C28-74259C5E45EC}" dt="2020-09-20T05:11:38.836" v="1895" actId="478"/>
+          <ac:spMkLst>
+            <pc:docMk/>
+            <pc:sldMk cId="1996978805" sldId="261"/>
+            <ac:spMk id="7" creationId="{B600CEE1-5FE7-47B1-A7C2-7C93F179CCB8}"/>
+          </ac:spMkLst>
+        </pc:spChg>
+        <pc:spChg chg="add mod">
+          <ac:chgData name="tien-i Kao" userId="a59c1bdb761853cd" providerId="LiveId" clId="{4C338B32-0D6F-4D56-8C28-74259C5E45EC}" dt="2020-09-20T05:17:40.276" v="2080" actId="1076"/>
+          <ac:spMkLst>
+            <pc:docMk/>
+            <pc:sldMk cId="1996978805" sldId="261"/>
+            <ac:spMk id="8" creationId="{E043F8CC-07EC-4A2E-A4FB-FB8CC9FCAAB0}"/>
+          </ac:spMkLst>
+        </pc:spChg>
+        <pc:spChg chg="add mod">
+          <ac:chgData name="tien-i Kao" userId="a59c1bdb761853cd" providerId="LiveId" clId="{4C338B32-0D6F-4D56-8C28-74259C5E45EC}" dt="2020-09-20T05:12:26.418" v="1919" actId="1076"/>
+          <ac:spMkLst>
+            <pc:docMk/>
+            <pc:sldMk cId="1996978805" sldId="261"/>
+            <ac:spMk id="9" creationId="{A7AB7833-C993-4FE8-B975-C536A3D08964}"/>
+          </ac:spMkLst>
+        </pc:spChg>
+        <pc:spChg chg="add mod">
+          <ac:chgData name="tien-i Kao" userId="a59c1bdb761853cd" providerId="LiveId" clId="{4C338B32-0D6F-4D56-8C28-74259C5E45EC}" dt="2020-09-20T05:17:40.276" v="2080" actId="1076"/>
+          <ac:spMkLst>
+            <pc:docMk/>
+            <pc:sldMk cId="1996978805" sldId="261"/>
+            <ac:spMk id="10" creationId="{C8E7604B-94B7-4B79-9111-3045FF725DCE}"/>
+          </ac:spMkLst>
+        </pc:spChg>
+        <pc:picChg chg="add mod">
+          <ac:chgData name="tien-i Kao" userId="a59c1bdb761853cd" providerId="LiveId" clId="{4C338B32-0D6F-4D56-8C28-74259C5E45EC}" dt="2020-09-20T05:17:40.276" v="2080" actId="1076"/>
+          <ac:picMkLst>
+            <pc:docMk/>
+            <pc:sldMk cId="1996978805" sldId="261"/>
+            <ac:picMk id="5" creationId="{22C8CB3C-BDB4-4E39-9FEB-4978704C111B}"/>
+          </ac:picMkLst>
+        </pc:picChg>
+      </pc:sldChg>
+      <pc:sldChg chg="new del">
+        <pc:chgData name="tien-i Kao" userId="a59c1bdb761853cd" providerId="LiveId" clId="{4C338B32-0D6F-4D56-8C28-74259C5E45EC}" dt="2020-09-17T08:51:00.827" v="1340" actId="47"/>
+        <pc:sldMkLst>
+          <pc:docMk/>
+          <pc:sldMk cId="2541832969" sldId="261"/>
+        </pc:sldMkLst>
+      </pc:sldChg>
+      <pc:sldChg chg="new del">
+        <pc:chgData name="tien-i Kao" userId="a59c1bdb761853cd" providerId="LiveId" clId="{4C338B32-0D6F-4D56-8C28-74259C5E45EC}" dt="2020-09-20T05:10:03.232" v="1861" actId="47"/>
+        <pc:sldMkLst>
+          <pc:docMk/>
+          <pc:sldMk cId="4203495285" sldId="262"/>
+        </pc:sldMkLst>
+      </pc:sldChg>
+      <pc:sldChg chg="addSp delSp modSp add mod">
+        <pc:chgData name="tien-i Kao" userId="a59c1bdb761853cd" providerId="LiveId" clId="{4C338B32-0D6F-4D56-8C28-74259C5E45EC}" dt="2020-09-20T05:15:24.860" v="2020" actId="1076"/>
+        <pc:sldMkLst>
+          <pc:docMk/>
+          <pc:sldMk cId="168721048" sldId="263"/>
+        </pc:sldMkLst>
+        <pc:spChg chg="mod">
+          <ac:chgData name="tien-i Kao" userId="a59c1bdb761853cd" providerId="LiveId" clId="{4C338B32-0D6F-4D56-8C28-74259C5E45EC}" dt="2020-09-20T05:10:44.023" v="1879" actId="20577"/>
+          <ac:spMkLst>
+            <pc:docMk/>
+            <pc:sldMk cId="168721048" sldId="263"/>
+            <ac:spMk id="3" creationId="{90BA72A2-8C20-4B22-9BF7-6745B0569E99}"/>
+          </ac:spMkLst>
+        </pc:spChg>
+        <pc:spChg chg="add mod">
+          <ac:chgData name="tien-i Kao" userId="a59c1bdb761853cd" providerId="LiveId" clId="{4C338B32-0D6F-4D56-8C28-74259C5E45EC}" dt="2020-09-20T05:15:24.860" v="2020" actId="1076"/>
+          <ac:spMkLst>
+            <pc:docMk/>
+            <pc:sldMk cId="168721048" sldId="263"/>
+            <ac:spMk id="4" creationId="{FAFA6627-5131-4DF4-8289-D2AC6C464F16}"/>
+          </ac:spMkLst>
+        </pc:spChg>
+        <pc:spChg chg="del">
+          <ac:chgData name="tien-i Kao" userId="a59c1bdb761853cd" providerId="LiveId" clId="{4C338B32-0D6F-4D56-8C28-74259C5E45EC}" dt="2020-09-20T05:10:09.107" v="1864" actId="478"/>
+          <ac:spMkLst>
+            <pc:docMk/>
+            <pc:sldMk cId="168721048" sldId="263"/>
+            <ac:spMk id="6" creationId="{AF32F072-1BFD-4D82-A5CC-91DAB66F679A}"/>
+          </ac:spMkLst>
+        </pc:spChg>
+        <pc:spChg chg="del">
+          <ac:chgData name="tien-i Kao" userId="a59c1bdb761853cd" providerId="LiveId" clId="{4C338B32-0D6F-4D56-8C28-74259C5E45EC}" dt="2020-09-20T05:10:08.077" v="1863" actId="478"/>
+          <ac:spMkLst>
+            <pc:docMk/>
+            <pc:sldMk cId="168721048" sldId="263"/>
+            <ac:spMk id="8" creationId="{E043F8CC-07EC-4A2E-A4FB-FB8CC9FCAAB0}"/>
+          </ac:spMkLst>
+        </pc:spChg>
+        <pc:picChg chg="del">
+          <ac:chgData name="tien-i Kao" userId="a59c1bdb761853cd" providerId="LiveId" clId="{4C338B32-0D6F-4D56-8C28-74259C5E45EC}" dt="2020-09-20T05:10:05.806" v="1862" actId="478"/>
+          <ac:picMkLst>
+            <pc:docMk/>
+            <pc:sldMk cId="168721048" sldId="263"/>
+            <ac:picMk id="5" creationId="{22C8CB3C-BDB4-4E39-9FEB-4978704C111B}"/>
+          </ac:picMkLst>
+        </pc:picChg>
+      </pc:sldChg>
+    </pc:docChg>
+  </pc:docChgLst>
+</pc:chgInfo>
 </file>
 
 <file path=ppt/slideLayouts/slideLayout1.xml><?xml version="1.0" encoding="utf-8"?>
@@ -151,10 +461,9 @@
           </a:lstStyle>
           <a:p>
             <a:r>
-              <a:rPr lang="zh-TW" altLang="en-US" smtClean="0"/>
+              <a:rPr lang="zh-TW" altLang="en-US"/>
               <a:t>按一下以編輯母片標題樣式</a:t>
             </a:r>
-            <a:endParaRPr lang="zh-TW" altLang="en-US"/>
           </a:p>
         </p:txBody>
       </p:sp>
@@ -216,10 +525,9 @@
           </a:lstStyle>
           <a:p>
             <a:r>
-              <a:rPr lang="zh-TW" altLang="en-US" smtClean="0"/>
+              <a:rPr lang="zh-TW" altLang="en-US"/>
               <a:t>按一下以編輯母片副標題樣式</a:t>
             </a:r>
-            <a:endParaRPr lang="zh-TW" altLang="en-US"/>
           </a:p>
         </p:txBody>
       </p:sp>
@@ -240,7 +548,7 @@
           <a:p>
             <a:fld id="{D06AB91F-86FE-4797-B150-E4B4D3393F5D}" type="datetimeFigureOut">
               <a:rPr lang="zh-TW" altLang="en-US" smtClean="0"/>
-              <a:t>2020/7/13</a:t>
+              <a:t>2020/9/20</a:t>
             </a:fld>
             <a:endParaRPr lang="zh-TW" altLang="en-US"/>
           </a:p>
@@ -334,10 +642,9 @@
           <a:lstStyle/>
           <a:p>
             <a:r>
-              <a:rPr lang="zh-TW" altLang="en-US" smtClean="0"/>
+              <a:rPr lang="zh-TW" altLang="en-US"/>
               <a:t>按一下以編輯母片標題樣式</a:t>
             </a:r>
-            <a:endParaRPr lang="zh-TW" altLang="en-US"/>
           </a:p>
         </p:txBody>
       </p:sp>
@@ -358,38 +665,37 @@
           <a:p>
             <a:pPr lvl="0"/>
             <a:r>
-              <a:rPr lang="zh-TW" altLang="en-US" smtClean="0"/>
+              <a:rPr lang="zh-TW" altLang="en-US"/>
               <a:t>按一下以編輯母片文字樣式</a:t>
             </a:r>
           </a:p>
           <a:p>
             <a:pPr lvl="1"/>
             <a:r>
-              <a:rPr lang="zh-TW" altLang="en-US" smtClean="0"/>
+              <a:rPr lang="zh-TW" altLang="en-US"/>
               <a:t>第二層</a:t>
             </a:r>
           </a:p>
           <a:p>
             <a:pPr lvl="2"/>
             <a:r>
-              <a:rPr lang="zh-TW" altLang="en-US" smtClean="0"/>
+              <a:rPr lang="zh-TW" altLang="en-US"/>
               <a:t>第三層</a:t>
             </a:r>
           </a:p>
           <a:p>
             <a:pPr lvl="3"/>
             <a:r>
-              <a:rPr lang="zh-TW" altLang="en-US" smtClean="0"/>
+              <a:rPr lang="zh-TW" altLang="en-US"/>
               <a:t>第四層</a:t>
             </a:r>
           </a:p>
           <a:p>
             <a:pPr lvl="4"/>
             <a:r>
-              <a:rPr lang="zh-TW" altLang="en-US" smtClean="0"/>
+              <a:rPr lang="zh-TW" altLang="en-US"/>
               <a:t>第五層</a:t>
             </a:r>
-            <a:endParaRPr lang="zh-TW" altLang="en-US"/>
           </a:p>
         </p:txBody>
       </p:sp>
@@ -410,7 +716,7 @@
           <a:p>
             <a:fld id="{D06AB91F-86FE-4797-B150-E4B4D3393F5D}" type="datetimeFigureOut">
               <a:rPr lang="zh-TW" altLang="en-US" smtClean="0"/>
-              <a:t>2020/7/13</a:t>
+              <a:t>2020/9/20</a:t>
             </a:fld>
             <a:endParaRPr lang="zh-TW" altLang="en-US"/>
           </a:p>
@@ -509,10 +815,9 @@
           <a:lstStyle/>
           <a:p>
             <a:r>
-              <a:rPr lang="zh-TW" altLang="en-US" smtClean="0"/>
+              <a:rPr lang="zh-TW" altLang="en-US"/>
               <a:t>按一下以編輯母片標題樣式</a:t>
             </a:r>
-            <a:endParaRPr lang="zh-TW" altLang="en-US"/>
           </a:p>
         </p:txBody>
       </p:sp>
@@ -538,38 +843,37 @@
           <a:p>
             <a:pPr lvl="0"/>
             <a:r>
-              <a:rPr lang="zh-TW" altLang="en-US" smtClean="0"/>
+              <a:rPr lang="zh-TW" altLang="en-US"/>
               <a:t>按一下以編輯母片文字樣式</a:t>
             </a:r>
           </a:p>
           <a:p>
             <a:pPr lvl="1"/>
             <a:r>
-              <a:rPr lang="zh-TW" altLang="en-US" smtClean="0"/>
+              <a:rPr lang="zh-TW" altLang="en-US"/>
               <a:t>第二層</a:t>
             </a:r>
           </a:p>
           <a:p>
             <a:pPr lvl="2"/>
             <a:r>
-              <a:rPr lang="zh-TW" altLang="en-US" smtClean="0"/>
+              <a:rPr lang="zh-TW" altLang="en-US"/>
               <a:t>第三層</a:t>
             </a:r>
           </a:p>
           <a:p>
             <a:pPr lvl="3"/>
             <a:r>
-              <a:rPr lang="zh-TW" altLang="en-US" smtClean="0"/>
+              <a:rPr lang="zh-TW" altLang="en-US"/>
               <a:t>第四層</a:t>
             </a:r>
           </a:p>
           <a:p>
             <a:pPr lvl="4"/>
             <a:r>
-              <a:rPr lang="zh-TW" altLang="en-US" smtClean="0"/>
+              <a:rPr lang="zh-TW" altLang="en-US"/>
               <a:t>第五層</a:t>
             </a:r>
-            <a:endParaRPr lang="zh-TW" altLang="en-US"/>
           </a:p>
         </p:txBody>
       </p:sp>
@@ -590,7 +894,7 @@
           <a:p>
             <a:fld id="{D06AB91F-86FE-4797-B150-E4B4D3393F5D}" type="datetimeFigureOut">
               <a:rPr lang="zh-TW" altLang="en-US" smtClean="0"/>
-              <a:t>2020/7/13</a:t>
+              <a:t>2020/9/20</a:t>
             </a:fld>
             <a:endParaRPr lang="zh-TW" altLang="en-US"/>
           </a:p>
@@ -684,10 +988,9 @@
           <a:lstStyle/>
           <a:p>
             <a:r>
-              <a:rPr lang="zh-TW" altLang="en-US" smtClean="0"/>
+              <a:rPr lang="zh-TW" altLang="en-US"/>
               <a:t>按一下以編輯母片標題樣式</a:t>
             </a:r>
-            <a:endParaRPr lang="zh-TW" altLang="en-US"/>
           </a:p>
         </p:txBody>
       </p:sp>
@@ -708,38 +1011,37 @@
           <a:p>
             <a:pPr lvl="0"/>
             <a:r>
-              <a:rPr lang="zh-TW" altLang="en-US" smtClean="0"/>
+              <a:rPr lang="zh-TW" altLang="en-US"/>
               <a:t>按一下以編輯母片文字樣式</a:t>
             </a:r>
           </a:p>
           <a:p>
             <a:pPr lvl="1"/>
             <a:r>
-              <a:rPr lang="zh-TW" altLang="en-US" smtClean="0"/>
+              <a:rPr lang="zh-TW" altLang="en-US"/>
               <a:t>第二層</a:t>
             </a:r>
           </a:p>
           <a:p>
             <a:pPr lvl="2"/>
             <a:r>
-              <a:rPr lang="zh-TW" altLang="en-US" smtClean="0"/>
+              <a:rPr lang="zh-TW" altLang="en-US"/>
               <a:t>第三層</a:t>
             </a:r>
           </a:p>
           <a:p>
             <a:pPr lvl="3"/>
             <a:r>
-              <a:rPr lang="zh-TW" altLang="en-US" smtClean="0"/>
+              <a:rPr lang="zh-TW" altLang="en-US"/>
               <a:t>第四層</a:t>
             </a:r>
           </a:p>
           <a:p>
             <a:pPr lvl="4"/>
             <a:r>
-              <a:rPr lang="zh-TW" altLang="en-US" smtClean="0"/>
+              <a:rPr lang="zh-TW" altLang="en-US"/>
               <a:t>第五層</a:t>
             </a:r>
-            <a:endParaRPr lang="zh-TW" altLang="en-US"/>
           </a:p>
         </p:txBody>
       </p:sp>
@@ -760,7 +1062,7 @@
           <a:p>
             <a:fld id="{D06AB91F-86FE-4797-B150-E4B4D3393F5D}" type="datetimeFigureOut">
               <a:rPr lang="zh-TW" altLang="en-US" smtClean="0"/>
-              <a:t>2020/7/13</a:t>
+              <a:t>2020/9/20</a:t>
             </a:fld>
             <a:endParaRPr lang="zh-TW" altLang="en-US"/>
           </a:p>
@@ -863,10 +1165,9 @@
           </a:lstStyle>
           <a:p>
             <a:r>
-              <a:rPr lang="zh-TW" altLang="en-US" smtClean="0"/>
+              <a:rPr lang="zh-TW" altLang="en-US"/>
               <a:t>按一下以編輯母片標題樣式</a:t>
             </a:r>
-            <a:endParaRPr lang="zh-TW" altLang="en-US"/>
           </a:p>
         </p:txBody>
       </p:sp>
@@ -983,7 +1284,7 @@
           <a:p>
             <a:pPr lvl="0"/>
             <a:r>
-              <a:rPr lang="zh-TW" altLang="en-US" smtClean="0"/>
+              <a:rPr lang="zh-TW" altLang="en-US"/>
               <a:t>按一下以編輯母片文字樣式</a:t>
             </a:r>
           </a:p>
@@ -1006,7 +1307,7 @@
           <a:p>
             <a:fld id="{D06AB91F-86FE-4797-B150-E4B4D3393F5D}" type="datetimeFigureOut">
               <a:rPr lang="zh-TW" altLang="en-US" smtClean="0"/>
-              <a:t>2020/7/13</a:t>
+              <a:t>2020/9/20</a:t>
             </a:fld>
             <a:endParaRPr lang="zh-TW" altLang="en-US"/>
           </a:p>
@@ -1100,10 +1401,9 @@
           <a:lstStyle/>
           <a:p>
             <a:r>
-              <a:rPr lang="zh-TW" altLang="en-US" smtClean="0"/>
+              <a:rPr lang="zh-TW" altLang="en-US"/>
               <a:t>按一下以編輯母片標題樣式</a:t>
             </a:r>
-            <a:endParaRPr lang="zh-TW" altLang="en-US"/>
           </a:p>
         </p:txBody>
       </p:sp>
@@ -1129,38 +1429,37 @@
           <a:p>
             <a:pPr lvl="0"/>
             <a:r>
-              <a:rPr lang="zh-TW" altLang="en-US" smtClean="0"/>
+              <a:rPr lang="zh-TW" altLang="en-US"/>
               <a:t>按一下以編輯母片文字樣式</a:t>
             </a:r>
           </a:p>
           <a:p>
             <a:pPr lvl="1"/>
             <a:r>
-              <a:rPr lang="zh-TW" altLang="en-US" smtClean="0"/>
+              <a:rPr lang="zh-TW" altLang="en-US"/>
               <a:t>第二層</a:t>
             </a:r>
           </a:p>
           <a:p>
             <a:pPr lvl="2"/>
             <a:r>
-              <a:rPr lang="zh-TW" altLang="en-US" smtClean="0"/>
+              <a:rPr lang="zh-TW" altLang="en-US"/>
               <a:t>第三層</a:t>
             </a:r>
           </a:p>
           <a:p>
             <a:pPr lvl="3"/>
             <a:r>
-              <a:rPr lang="zh-TW" altLang="en-US" smtClean="0"/>
+              <a:rPr lang="zh-TW" altLang="en-US"/>
               <a:t>第四層</a:t>
             </a:r>
           </a:p>
           <a:p>
             <a:pPr lvl="4"/>
             <a:r>
-              <a:rPr lang="zh-TW" altLang="en-US" smtClean="0"/>
+              <a:rPr lang="zh-TW" altLang="en-US"/>
               <a:t>第五層</a:t>
             </a:r>
-            <a:endParaRPr lang="zh-TW" altLang="en-US"/>
           </a:p>
         </p:txBody>
       </p:sp>
@@ -1186,38 +1485,37 @@
           <a:p>
             <a:pPr lvl="0"/>
             <a:r>
-              <a:rPr lang="zh-TW" altLang="en-US" smtClean="0"/>
+              <a:rPr lang="zh-TW" altLang="en-US"/>
               <a:t>按一下以編輯母片文字樣式</a:t>
             </a:r>
           </a:p>
           <a:p>
             <a:pPr lvl="1"/>
             <a:r>
-              <a:rPr lang="zh-TW" altLang="en-US" smtClean="0"/>
+              <a:rPr lang="zh-TW" altLang="en-US"/>
               <a:t>第二層</a:t>
             </a:r>
           </a:p>
           <a:p>
             <a:pPr lvl="2"/>
             <a:r>
-              <a:rPr lang="zh-TW" altLang="en-US" smtClean="0"/>
+              <a:rPr lang="zh-TW" altLang="en-US"/>
               <a:t>第三層</a:t>
             </a:r>
           </a:p>
           <a:p>
             <a:pPr lvl="3"/>
             <a:r>
-              <a:rPr lang="zh-TW" altLang="en-US" smtClean="0"/>
+              <a:rPr lang="zh-TW" altLang="en-US"/>
               <a:t>第四層</a:t>
             </a:r>
           </a:p>
           <a:p>
             <a:pPr lvl="4"/>
             <a:r>
-              <a:rPr lang="zh-TW" altLang="en-US" smtClean="0"/>
+              <a:rPr lang="zh-TW" altLang="en-US"/>
               <a:t>第五層</a:t>
             </a:r>
-            <a:endParaRPr lang="zh-TW" altLang="en-US"/>
           </a:p>
         </p:txBody>
       </p:sp>
@@ -1238,7 +1536,7 @@
           <a:p>
             <a:fld id="{D06AB91F-86FE-4797-B150-E4B4D3393F5D}" type="datetimeFigureOut">
               <a:rPr lang="zh-TW" altLang="en-US" smtClean="0"/>
-              <a:t>2020/7/13</a:t>
+              <a:t>2020/9/20</a:t>
             </a:fld>
             <a:endParaRPr lang="zh-TW" altLang="en-US"/>
           </a:p>
@@ -1337,10 +1635,9 @@
           <a:lstStyle/>
           <a:p>
             <a:r>
-              <a:rPr lang="zh-TW" altLang="en-US" smtClean="0"/>
+              <a:rPr lang="zh-TW" altLang="en-US"/>
               <a:t>按一下以編輯母片標題樣式</a:t>
             </a:r>
-            <a:endParaRPr lang="zh-TW" altLang="en-US"/>
           </a:p>
         </p:txBody>
       </p:sp>
@@ -1403,7 +1700,7 @@
           <a:p>
             <a:pPr lvl="0"/>
             <a:r>
-              <a:rPr lang="zh-TW" altLang="en-US" smtClean="0"/>
+              <a:rPr lang="zh-TW" altLang="en-US"/>
               <a:t>按一下以編輯母片文字樣式</a:t>
             </a:r>
           </a:p>
@@ -1431,38 +1728,37 @@
           <a:p>
             <a:pPr lvl="0"/>
             <a:r>
-              <a:rPr lang="zh-TW" altLang="en-US" smtClean="0"/>
+              <a:rPr lang="zh-TW" altLang="en-US"/>
               <a:t>按一下以編輯母片文字樣式</a:t>
             </a:r>
           </a:p>
           <a:p>
             <a:pPr lvl="1"/>
             <a:r>
-              <a:rPr lang="zh-TW" altLang="en-US" smtClean="0"/>
+              <a:rPr lang="zh-TW" altLang="en-US"/>
               <a:t>第二層</a:t>
             </a:r>
           </a:p>
           <a:p>
             <a:pPr lvl="2"/>
             <a:r>
-              <a:rPr lang="zh-TW" altLang="en-US" smtClean="0"/>
+              <a:rPr lang="zh-TW" altLang="en-US"/>
               <a:t>第三層</a:t>
             </a:r>
           </a:p>
           <a:p>
             <a:pPr lvl="3"/>
             <a:r>
-              <a:rPr lang="zh-TW" altLang="en-US" smtClean="0"/>
+              <a:rPr lang="zh-TW" altLang="en-US"/>
               <a:t>第四層</a:t>
             </a:r>
           </a:p>
           <a:p>
             <a:pPr lvl="4"/>
             <a:r>
-              <a:rPr lang="zh-TW" altLang="en-US" smtClean="0"/>
+              <a:rPr lang="zh-TW" altLang="en-US"/>
               <a:t>第五層</a:t>
             </a:r>
-            <a:endParaRPr lang="zh-TW" altLang="en-US"/>
           </a:p>
         </p:txBody>
       </p:sp>
@@ -1525,7 +1821,7 @@
           <a:p>
             <a:pPr lvl="0"/>
             <a:r>
-              <a:rPr lang="zh-TW" altLang="en-US" smtClean="0"/>
+              <a:rPr lang="zh-TW" altLang="en-US"/>
               <a:t>按一下以編輯母片文字樣式</a:t>
             </a:r>
           </a:p>
@@ -1553,38 +1849,37 @@
           <a:p>
             <a:pPr lvl="0"/>
             <a:r>
-              <a:rPr lang="zh-TW" altLang="en-US" smtClean="0"/>
+              <a:rPr lang="zh-TW" altLang="en-US"/>
               <a:t>按一下以編輯母片文字樣式</a:t>
             </a:r>
           </a:p>
           <a:p>
             <a:pPr lvl="1"/>
             <a:r>
-              <a:rPr lang="zh-TW" altLang="en-US" smtClean="0"/>
+              <a:rPr lang="zh-TW" altLang="en-US"/>
               <a:t>第二層</a:t>
             </a:r>
           </a:p>
           <a:p>
             <a:pPr lvl="2"/>
             <a:r>
-              <a:rPr lang="zh-TW" altLang="en-US" smtClean="0"/>
+              <a:rPr lang="zh-TW" altLang="en-US"/>
               <a:t>第三層</a:t>
             </a:r>
           </a:p>
           <a:p>
             <a:pPr lvl="3"/>
             <a:r>
-              <a:rPr lang="zh-TW" altLang="en-US" smtClean="0"/>
+              <a:rPr lang="zh-TW" altLang="en-US"/>
               <a:t>第四層</a:t>
             </a:r>
           </a:p>
           <a:p>
             <a:pPr lvl="4"/>
             <a:r>
-              <a:rPr lang="zh-TW" altLang="en-US" smtClean="0"/>
+              <a:rPr lang="zh-TW" altLang="en-US"/>
               <a:t>第五層</a:t>
             </a:r>
-            <a:endParaRPr lang="zh-TW" altLang="en-US"/>
           </a:p>
         </p:txBody>
       </p:sp>
@@ -1605,7 +1900,7 @@
           <a:p>
             <a:fld id="{D06AB91F-86FE-4797-B150-E4B4D3393F5D}" type="datetimeFigureOut">
               <a:rPr lang="zh-TW" altLang="en-US" smtClean="0"/>
-              <a:t>2020/7/13</a:t>
+              <a:t>2020/9/20</a:t>
             </a:fld>
             <a:endParaRPr lang="zh-TW" altLang="en-US"/>
           </a:p>
@@ -1699,10 +1994,9 @@
           <a:lstStyle/>
           <a:p>
             <a:r>
-              <a:rPr lang="zh-TW" altLang="en-US" smtClean="0"/>
+              <a:rPr lang="zh-TW" altLang="en-US"/>
               <a:t>按一下以編輯母片標題樣式</a:t>
             </a:r>
-            <a:endParaRPr lang="zh-TW" altLang="en-US"/>
           </a:p>
         </p:txBody>
       </p:sp>
@@ -1723,7 +2017,7 @@
           <a:p>
             <a:fld id="{D06AB91F-86FE-4797-B150-E4B4D3393F5D}" type="datetimeFigureOut">
               <a:rPr lang="zh-TW" altLang="en-US" smtClean="0"/>
-              <a:t>2020/7/13</a:t>
+              <a:t>2020/9/20</a:t>
             </a:fld>
             <a:endParaRPr lang="zh-TW" altLang="en-US"/>
           </a:p>
@@ -1818,7 +2112,7 @@
           <a:p>
             <a:fld id="{D06AB91F-86FE-4797-B150-E4B4D3393F5D}" type="datetimeFigureOut">
               <a:rPr lang="zh-TW" altLang="en-US" smtClean="0"/>
-              <a:t>2020/7/13</a:t>
+              <a:t>2020/9/20</a:t>
             </a:fld>
             <a:endParaRPr lang="zh-TW" altLang="en-US"/>
           </a:p>
@@ -1921,10 +2215,9 @@
           </a:lstStyle>
           <a:p>
             <a:r>
-              <a:rPr lang="zh-TW" altLang="en-US" smtClean="0"/>
+              <a:rPr lang="zh-TW" altLang="en-US"/>
               <a:t>按一下以編輯母片標題樣式</a:t>
             </a:r>
-            <a:endParaRPr lang="zh-TW" altLang="en-US"/>
           </a:p>
         </p:txBody>
       </p:sp>
@@ -1978,38 +2271,37 @@
           <a:p>
             <a:pPr lvl="0"/>
             <a:r>
-              <a:rPr lang="zh-TW" altLang="en-US" smtClean="0"/>
+              <a:rPr lang="zh-TW" altLang="en-US"/>
               <a:t>按一下以編輯母片文字樣式</a:t>
             </a:r>
           </a:p>
           <a:p>
             <a:pPr lvl="1"/>
             <a:r>
-              <a:rPr lang="zh-TW" altLang="en-US" smtClean="0"/>
+              <a:rPr lang="zh-TW" altLang="en-US"/>
               <a:t>第二層</a:t>
             </a:r>
           </a:p>
           <a:p>
             <a:pPr lvl="2"/>
             <a:r>
-              <a:rPr lang="zh-TW" altLang="en-US" smtClean="0"/>
+              <a:rPr lang="zh-TW" altLang="en-US"/>
               <a:t>第三層</a:t>
             </a:r>
           </a:p>
           <a:p>
             <a:pPr lvl="3"/>
             <a:r>
-              <a:rPr lang="zh-TW" altLang="en-US" smtClean="0"/>
+              <a:rPr lang="zh-TW" altLang="en-US"/>
               <a:t>第四層</a:t>
             </a:r>
           </a:p>
           <a:p>
             <a:pPr lvl="4"/>
             <a:r>
-              <a:rPr lang="zh-TW" altLang="en-US" smtClean="0"/>
+              <a:rPr lang="zh-TW" altLang="en-US"/>
               <a:t>第五層</a:t>
             </a:r>
-            <a:endParaRPr lang="zh-TW" altLang="en-US"/>
           </a:p>
         </p:txBody>
       </p:sp>
@@ -2072,7 +2364,7 @@
           <a:p>
             <a:pPr lvl="0"/>
             <a:r>
-              <a:rPr lang="zh-TW" altLang="en-US" smtClean="0"/>
+              <a:rPr lang="zh-TW" altLang="en-US"/>
               <a:t>按一下以編輯母片文字樣式</a:t>
             </a:r>
           </a:p>
@@ -2095,7 +2387,7 @@
           <a:p>
             <a:fld id="{D06AB91F-86FE-4797-B150-E4B4D3393F5D}" type="datetimeFigureOut">
               <a:rPr lang="zh-TW" altLang="en-US" smtClean="0"/>
-              <a:t>2020/7/13</a:t>
+              <a:t>2020/9/20</a:t>
             </a:fld>
             <a:endParaRPr lang="zh-TW" altLang="en-US"/>
           </a:p>
@@ -2198,10 +2490,9 @@
           </a:lstStyle>
           <a:p>
             <a:r>
-              <a:rPr lang="zh-TW" altLang="en-US" smtClean="0"/>
+              <a:rPr lang="zh-TW" altLang="en-US"/>
               <a:t>按一下以編輯母片標題樣式</a:t>
             </a:r>
-            <a:endParaRPr lang="zh-TW" altLang="en-US"/>
           </a:p>
         </p:txBody>
       </p:sp>
@@ -2325,7 +2616,7 @@
           <a:p>
             <a:pPr lvl="0"/>
             <a:r>
-              <a:rPr lang="zh-TW" altLang="en-US" smtClean="0"/>
+              <a:rPr lang="zh-TW" altLang="en-US"/>
               <a:t>按一下以編輯母片文字樣式</a:t>
             </a:r>
           </a:p>
@@ -2348,7 +2639,7 @@
           <a:p>
             <a:fld id="{D06AB91F-86FE-4797-B150-E4B4D3393F5D}" type="datetimeFigureOut">
               <a:rPr lang="zh-TW" altLang="en-US" smtClean="0"/>
-              <a:t>2020/7/13</a:t>
+              <a:t>2020/9/20</a:t>
             </a:fld>
             <a:endParaRPr lang="zh-TW" altLang="en-US"/>
           </a:p>
@@ -2457,10 +2748,9 @@
           <a:lstStyle/>
           <a:p>
             <a:r>
-              <a:rPr lang="zh-TW" altLang="en-US" smtClean="0"/>
+              <a:rPr lang="zh-TW" altLang="en-US"/>
               <a:t>按一下以編輯母片標題樣式</a:t>
             </a:r>
-            <a:endParaRPr lang="zh-TW" altLang="en-US"/>
           </a:p>
         </p:txBody>
       </p:sp>
@@ -2491,38 +2781,37 @@
           <a:p>
             <a:pPr lvl="0"/>
             <a:r>
-              <a:rPr lang="zh-TW" altLang="en-US" smtClean="0"/>
+              <a:rPr lang="zh-TW" altLang="en-US"/>
               <a:t>按一下以編輯母片文字樣式</a:t>
             </a:r>
           </a:p>
           <a:p>
             <a:pPr lvl="1"/>
             <a:r>
-              <a:rPr lang="zh-TW" altLang="en-US" smtClean="0"/>
+              <a:rPr lang="zh-TW" altLang="en-US"/>
               <a:t>第二層</a:t>
             </a:r>
           </a:p>
           <a:p>
             <a:pPr lvl="2"/>
             <a:r>
-              <a:rPr lang="zh-TW" altLang="en-US" smtClean="0"/>
+              <a:rPr lang="zh-TW" altLang="en-US"/>
               <a:t>第三層</a:t>
             </a:r>
           </a:p>
           <a:p>
             <a:pPr lvl="3"/>
             <a:r>
-              <a:rPr lang="zh-TW" altLang="en-US" smtClean="0"/>
+              <a:rPr lang="zh-TW" altLang="en-US"/>
               <a:t>第四層</a:t>
             </a:r>
           </a:p>
           <a:p>
             <a:pPr lvl="4"/>
             <a:r>
-              <a:rPr lang="zh-TW" altLang="en-US" smtClean="0"/>
+              <a:rPr lang="zh-TW" altLang="en-US"/>
               <a:t>第五層</a:t>
             </a:r>
-            <a:endParaRPr lang="zh-TW" altLang="en-US"/>
           </a:p>
         </p:txBody>
       </p:sp>
@@ -2561,7 +2850,7 @@
           <a:p>
             <a:fld id="{D06AB91F-86FE-4797-B150-E4B4D3393F5D}" type="datetimeFigureOut">
               <a:rPr lang="zh-TW" altLang="en-US" smtClean="0"/>
-              <a:t>2020/7/13</a:t>
+              <a:t>2020/9/20</a:t>
             </a:fld>
             <a:endParaRPr lang="zh-TW" altLang="en-US"/>
           </a:p>
@@ -3001,7 +3290,7 @@
           <a:p>
             <a:pPr algn="ctr"/>
             <a:r>
-              <a:rPr lang="zh-TW" altLang="en-US" dirty="0" smtClean="0">
+              <a:rPr lang="zh-TW" altLang="en-US" dirty="0">
                 <a:solidFill>
                   <a:schemeClr val="bg1"/>
                 </a:solidFill>
@@ -3009,7 +3298,7 @@
               <a:t>雲端</a:t>
             </a:r>
             <a:r>
-              <a:rPr lang="en-US" altLang="zh-TW" dirty="0" smtClean="0">
+              <a:rPr lang="en-US" altLang="zh-TW" dirty="0">
                 <a:solidFill>
                   <a:schemeClr val="bg1"/>
                 </a:solidFill>
@@ -3017,14 +3306,14 @@
               <a:t>A</a:t>
             </a:r>
             <a:r>
-              <a:rPr lang="zh-TW" altLang="en-US" dirty="0" smtClean="0">
+              <a:rPr lang="zh-TW" altLang="en-US" dirty="0">
                 <a:solidFill>
                   <a:schemeClr val="bg1"/>
                 </a:solidFill>
               </a:rPr>
               <a:t>內含</a:t>
             </a:r>
-            <a:endParaRPr lang="en-US" altLang="zh-TW" dirty="0" smtClean="0">
+            <a:endParaRPr lang="en-US" altLang="zh-TW" dirty="0">
               <a:solidFill>
                 <a:schemeClr val="bg1"/>
               </a:solidFill>
@@ -3033,7 +3322,7 @@
           <a:p>
             <a:pPr algn="ctr"/>
             <a:r>
-              <a:rPr lang="zh-TW" altLang="en-US" dirty="0" smtClean="0">
+              <a:rPr lang="zh-TW" altLang="en-US" dirty="0">
                 <a:solidFill>
                   <a:schemeClr val="bg1"/>
                 </a:solidFill>
@@ -3041,7 +3330,7 @@
               <a:t>樣本圖</a:t>
             </a:r>
             <a:r>
-              <a:rPr lang="en-US" altLang="zh-TW" dirty="0" smtClean="0">
+              <a:rPr lang="en-US" altLang="zh-TW" dirty="0">
                 <a:solidFill>
                   <a:schemeClr val="bg1"/>
                 </a:solidFill>
@@ -3049,14 +3338,14 @@
               <a:t>300</a:t>
             </a:r>
             <a:r>
-              <a:rPr lang="zh-TW" altLang="en-US" dirty="0" smtClean="0">
+              <a:rPr lang="zh-TW" altLang="en-US" dirty="0">
                 <a:solidFill>
                   <a:schemeClr val="bg1"/>
                 </a:solidFill>
               </a:rPr>
               <a:t>張</a:t>
             </a:r>
-            <a:endParaRPr lang="en-US" altLang="zh-TW" dirty="0" smtClean="0">
+            <a:endParaRPr lang="en-US" altLang="zh-TW" dirty="0">
               <a:solidFill>
                 <a:schemeClr val="bg1"/>
               </a:solidFill>
@@ -3065,7 +3354,7 @@
           <a:p>
             <a:pPr algn="ctr"/>
             <a:r>
-              <a:rPr lang="en-US" altLang="zh-TW" u="sng" dirty="0" smtClean="0">
+              <a:rPr lang="en-US" altLang="zh-TW" u="sng" dirty="0">
                 <a:solidFill>
                   <a:schemeClr val="bg1"/>
                 </a:solidFill>
@@ -3073,7 +3362,7 @@
               <a:t>(</a:t>
             </a:r>
             <a:r>
-              <a:rPr lang="zh-TW" altLang="en-US" u="sng" dirty="0" smtClean="0">
+              <a:rPr lang="zh-TW" altLang="en-US" u="sng" dirty="0">
                 <a:solidFill>
                   <a:schemeClr val="bg1"/>
                 </a:solidFill>
@@ -3081,7 +3370,7 @@
               <a:t>教師提供</a:t>
             </a:r>
             <a:r>
-              <a:rPr lang="en-US" altLang="zh-TW" u="sng" dirty="0" smtClean="0">
+              <a:rPr lang="en-US" altLang="zh-TW" u="sng" dirty="0">
                 <a:solidFill>
                   <a:schemeClr val="bg1"/>
                 </a:solidFill>
@@ -3172,14 +3461,14 @@
           <a:p>
             <a:pPr algn="ctr"/>
             <a:r>
-              <a:rPr lang="en-US" altLang="zh-TW" sz="2000" dirty="0" err="1" smtClean="0">
+              <a:rPr lang="en-US" altLang="zh-TW" sz="2000" err="1">
                 <a:solidFill>
                   <a:schemeClr val="bg1"/>
                 </a:solidFill>
               </a:rPr>
               <a:t>Colab</a:t>
             </a:r>
-            <a:endParaRPr lang="en-US" altLang="zh-TW" sz="2000" dirty="0" smtClean="0">
+            <a:endParaRPr lang="en-US" altLang="zh-TW" sz="2000">
               <a:solidFill>
                 <a:schemeClr val="bg1"/>
               </a:solidFill>
@@ -3257,21 +3546,21 @@
             <a:lstStyle/>
             <a:p>
               <a:r>
-                <a:rPr lang="zh-TW" altLang="en-US" dirty="0" smtClean="0">
+                <a:rPr lang="zh-TW" altLang="en-US">
                   <a:solidFill>
                     <a:schemeClr val="accent6"/>
                   </a:solidFill>
                 </a:rPr>
                 <a:t>學生下載</a:t>
               </a:r>
-              <a:endParaRPr lang="en-US" altLang="zh-TW" dirty="0" smtClean="0">
+              <a:endParaRPr lang="en-US" altLang="zh-TW">
                 <a:solidFill>
                   <a:schemeClr val="accent6"/>
                 </a:solidFill>
               </a:endParaRPr>
             </a:p>
             <a:p>
-              <a:endParaRPr lang="zh-TW" altLang="en-US" dirty="0">
+              <a:endParaRPr lang="zh-TW" altLang="en-US">
                 <a:solidFill>
                   <a:schemeClr val="accent6"/>
                 </a:solidFill>
@@ -3391,18 +3680,13 @@
             <a:lstStyle/>
             <a:p>
               <a:r>
-                <a:rPr lang="zh-TW" altLang="en-US" dirty="0" smtClean="0">
+                <a:rPr lang="zh-TW" altLang="en-US">
                   <a:solidFill>
                     <a:schemeClr val="accent6"/>
                   </a:solidFill>
                 </a:rPr>
                 <a:t>學生上傳</a:t>
               </a:r>
-              <a:endParaRPr lang="zh-TW" altLang="en-US" dirty="0">
-                <a:solidFill>
-                  <a:schemeClr val="accent6"/>
-                </a:solidFill>
-              </a:endParaRPr>
             </a:p>
           </p:txBody>
         </p:sp>
@@ -3477,18 +3761,13 @@
             <a:lstStyle/>
             <a:p>
               <a:r>
-                <a:rPr lang="zh-TW" altLang="en-US" dirty="0" smtClean="0">
+                <a:rPr lang="zh-TW" altLang="en-US">
                   <a:solidFill>
                     <a:schemeClr val="accent6"/>
                   </a:solidFill>
                 </a:rPr>
                 <a:t>資料搬移</a:t>
               </a:r>
-              <a:endParaRPr lang="zh-TW" altLang="en-US" dirty="0">
-                <a:solidFill>
-                  <a:schemeClr val="accent6"/>
-                </a:solidFill>
-              </a:endParaRPr>
             </a:p>
           </p:txBody>
         </p:sp>
@@ -3583,7 +3862,7 @@
             <a:p>
               <a:pPr algn="ctr"/>
               <a:r>
-                <a:rPr lang="zh-TW" altLang="en-US" dirty="0" smtClean="0">
+                <a:rPr lang="zh-TW" altLang="en-US">
                   <a:solidFill>
                     <a:schemeClr val="bg1"/>
                   </a:solidFill>
@@ -3591,7 +3870,7 @@
                 <a:t>雲端</a:t>
               </a:r>
               <a:r>
-                <a:rPr lang="en-US" altLang="zh-TW" dirty="0" smtClean="0">
+                <a:rPr lang="en-US" altLang="zh-TW">
                   <a:solidFill>
                     <a:schemeClr val="bg1"/>
                   </a:solidFill>
@@ -3602,7 +3881,7 @@
             <a:p>
               <a:pPr algn="ctr"/>
               <a:r>
-                <a:rPr lang="en-US" altLang="zh-TW" dirty="0" smtClean="0">
+                <a:rPr lang="en-US" altLang="zh-TW">
                   <a:solidFill>
                     <a:schemeClr val="bg1"/>
                   </a:solidFill>
@@ -3610,7 +3889,7 @@
                 <a:t>.h5 , </a:t>
               </a:r>
               <a:r>
-                <a:rPr lang="en-US" altLang="zh-TW" dirty="0" err="1" smtClean="0">
+                <a:rPr lang="en-US" altLang="zh-TW" err="1">
                   <a:solidFill>
                     <a:schemeClr val="bg1"/>
                   </a:solidFill>
@@ -3618,7 +3897,7 @@
                 <a:t>Json</a:t>
               </a:r>
               <a:r>
-                <a:rPr lang="en-US" altLang="zh-TW" dirty="0" smtClean="0">
+                <a:rPr lang="en-US" altLang="zh-TW">
                   <a:solidFill>
                     <a:schemeClr val="bg1"/>
                   </a:solidFill>
@@ -3626,18 +3905,13 @@
                 <a:t> </a:t>
               </a:r>
               <a:r>
-                <a:rPr lang="zh-TW" altLang="en-US" dirty="0" smtClean="0">
+                <a:rPr lang="zh-TW" altLang="en-US">
                   <a:solidFill>
                     <a:schemeClr val="bg1"/>
                   </a:solidFill>
                 </a:rPr>
                 <a:t>檔案</a:t>
               </a:r>
-              <a:endParaRPr lang="zh-TW" altLang="en-US" dirty="0">
-                <a:solidFill>
-                  <a:schemeClr val="bg1"/>
-                </a:solidFill>
-              </a:endParaRPr>
             </a:p>
           </p:txBody>
         </p:sp>
@@ -3753,18 +4027,13 @@
             <a:lstStyle/>
             <a:p>
               <a:r>
-                <a:rPr lang="zh-TW" altLang="en-US" dirty="0" smtClean="0">
+                <a:rPr lang="zh-TW" altLang="en-US">
                   <a:solidFill>
                     <a:schemeClr val="accent6"/>
                   </a:solidFill>
                 </a:rPr>
                 <a:t>資料搬移</a:t>
               </a:r>
-              <a:endParaRPr lang="zh-TW" altLang="en-US" dirty="0">
-                <a:solidFill>
-                  <a:schemeClr val="accent6"/>
-                </a:solidFill>
-              </a:endParaRPr>
             </a:p>
           </p:txBody>
         </p:sp>
@@ -4189,10 +4458,9 @@
           <a:lstStyle/>
           <a:p>
             <a:r>
-              <a:rPr lang="zh-TW" altLang="en-US" sz="1600" dirty="0" smtClean="0"/>
+              <a:rPr lang="zh-TW" altLang="en-US" sz="1600"/>
               <a:t>機器學習</a:t>
             </a:r>
-            <a:endParaRPr lang="zh-TW" altLang="en-US" sz="1600" dirty="0"/>
           </a:p>
         </p:txBody>
       </p:sp>
@@ -4259,7 +4527,7 @@
               <a:p>
                 <a:pPr algn="ctr"/>
                 <a:r>
-                  <a:rPr lang="zh-TW" altLang="en-US" dirty="0" smtClean="0">
+                  <a:rPr lang="zh-TW" altLang="en-US">
                     <a:solidFill>
                       <a:schemeClr val="bg1"/>
                     </a:solidFill>
@@ -4267,14 +4535,14 @@
                   <a:t>雲端</a:t>
                 </a:r>
                 <a:r>
-                  <a:rPr lang="en-US" altLang="zh-TW" sz="2000" dirty="0" smtClean="0">
+                  <a:rPr lang="en-US" altLang="zh-TW" sz="2000">
                     <a:solidFill>
                       <a:schemeClr val="bg1"/>
                     </a:solidFill>
                   </a:rPr>
                   <a:t>B</a:t>
                 </a:r>
-                <a:endParaRPr lang="zh-TW" altLang="en-US" sz="2000" dirty="0">
+                <a:endParaRPr lang="zh-TW" altLang="en-US" sz="2000">
                   <a:solidFill>
                     <a:schemeClr val="bg1"/>
                   </a:solidFill>
@@ -4429,10 +4697,10 @@
             <a:lstStyle/>
             <a:p>
               <a:r>
-                <a:rPr lang="en-US" altLang="zh-TW" dirty="0" smtClean="0"/>
+                <a:rPr lang="en-US" altLang="zh-TW"/>
                 <a:t>Annotations</a:t>
               </a:r>
-              <a:endParaRPr lang="zh-TW" altLang="en-US" dirty="0"/>
+              <a:endParaRPr lang="zh-TW" altLang="en-US"/>
             </a:p>
           </p:txBody>
         </p:sp>
@@ -4459,7 +4727,7 @@
             <a:lstStyle/>
             <a:p>
               <a:r>
-                <a:rPr lang="en-US" altLang="zh-TW" dirty="0" smtClean="0"/>
+                <a:rPr lang="en-US" altLang="zh-TW"/>
                 <a:t>Images</a:t>
               </a:r>
             </a:p>
@@ -4544,10 +4812,10 @@
             <a:lstStyle/>
             <a:p>
               <a:r>
-                <a:rPr lang="en-US" altLang="zh-TW" dirty="0"/>
+                <a:rPr lang="en-US" altLang="zh-TW"/>
                 <a:t>4</a:t>
               </a:r>
-              <a:endParaRPr lang="zh-TW" altLang="en-US" dirty="0"/>
+              <a:endParaRPr lang="zh-TW" altLang="en-US"/>
             </a:p>
           </p:txBody>
         </p:sp>
@@ -4630,10 +4898,10 @@
             <a:lstStyle/>
             <a:p>
               <a:r>
-                <a:rPr lang="en-US" altLang="zh-TW" dirty="0"/>
+                <a:rPr lang="en-US" altLang="zh-TW"/>
                 <a:t>5</a:t>
               </a:r>
-              <a:endParaRPr lang="zh-TW" altLang="en-US" dirty="0"/>
+              <a:endParaRPr lang="zh-TW" altLang="en-US"/>
             </a:p>
           </p:txBody>
         </p:sp>
@@ -4716,10 +4984,10 @@
             <a:lstStyle/>
             <a:p>
               <a:r>
-                <a:rPr lang="en-US" altLang="zh-TW" dirty="0" smtClean="0"/>
+                <a:rPr lang="en-US" altLang="zh-TW"/>
                 <a:t>1</a:t>
               </a:r>
-              <a:endParaRPr lang="zh-TW" altLang="en-US" dirty="0"/>
+              <a:endParaRPr lang="zh-TW" altLang="en-US"/>
             </a:p>
           </p:txBody>
         </p:sp>
@@ -4802,10 +5070,10 @@
             <a:lstStyle/>
             <a:p>
               <a:r>
-                <a:rPr lang="en-US" altLang="zh-TW" dirty="0"/>
+                <a:rPr lang="en-US" altLang="zh-TW"/>
                 <a:t>3</a:t>
               </a:r>
-              <a:endParaRPr lang="zh-TW" altLang="en-US" dirty="0"/>
+              <a:endParaRPr lang="zh-TW" altLang="en-US"/>
             </a:p>
           </p:txBody>
         </p:sp>
@@ -4888,10 +5156,10 @@
             <a:lstStyle/>
             <a:p>
               <a:r>
-                <a:rPr lang="en-US" altLang="zh-TW" dirty="0"/>
+                <a:rPr lang="en-US" altLang="zh-TW"/>
                 <a:t>6</a:t>
               </a:r>
-              <a:endParaRPr lang="zh-TW" altLang="en-US" dirty="0"/>
+              <a:endParaRPr lang="zh-TW" altLang="en-US"/>
             </a:p>
           </p:txBody>
         </p:sp>
@@ -4980,18 +5248,13 @@
             <a:lstStyle/>
             <a:p>
               <a:r>
-                <a:rPr lang="zh-TW" altLang="en-US" dirty="0" smtClean="0">
+                <a:rPr lang="zh-TW" altLang="en-US">
                   <a:solidFill>
                     <a:srgbClr val="FFC000"/>
                   </a:solidFill>
                 </a:rPr>
                 <a:t>學生下載</a:t>
               </a:r>
-              <a:endParaRPr lang="zh-TW" altLang="en-US" dirty="0">
-                <a:solidFill>
-                  <a:srgbClr val="FFC000"/>
-                </a:solidFill>
-              </a:endParaRPr>
             </a:p>
           </p:txBody>
         </p:sp>
@@ -5074,10 +5337,9 @@
             <a:lstStyle/>
             <a:p>
               <a:r>
-                <a:rPr lang="zh-TW" altLang="en-US" sz="1600" dirty="0" smtClean="0"/>
+                <a:rPr lang="zh-TW" altLang="en-US" sz="1600"/>
                 <a:t>樣本製作</a:t>
               </a:r>
-              <a:endParaRPr lang="zh-TW" altLang="en-US" sz="1600" dirty="0"/>
             </a:p>
           </p:txBody>
         </p:sp>
@@ -5104,18 +5366,13 @@
             <a:lstStyle/>
             <a:p>
               <a:r>
-                <a:rPr lang="zh-TW" altLang="en-US" sz="1600" dirty="0" smtClean="0">
+                <a:rPr lang="zh-TW" altLang="en-US" sz="1600" dirty="0">
                   <a:solidFill>
                     <a:srgbClr val="FFC000"/>
                   </a:solidFill>
                 </a:rPr>
-                <a:t>圖片辨識</a:t>
+                <a:t>物件偵測實驗</a:t>
               </a:r>
-              <a:endParaRPr lang="zh-TW" altLang="en-US" sz="1600" dirty="0">
-                <a:solidFill>
-                  <a:srgbClr val="FFC000"/>
-                </a:solidFill>
-              </a:endParaRPr>
             </a:p>
           </p:txBody>
         </p:sp>
@@ -5142,10 +5399,10 @@
             <a:lstStyle/>
             <a:p>
               <a:r>
-                <a:rPr lang="en-US" altLang="zh-TW" dirty="0" smtClean="0"/>
+                <a:rPr lang="en-US" altLang="zh-TW"/>
                 <a:t>8</a:t>
               </a:r>
-              <a:endParaRPr lang="zh-TW" altLang="en-US" dirty="0"/>
+              <a:endParaRPr lang="zh-TW" altLang="en-US"/>
             </a:p>
           </p:txBody>
         </p:sp>
@@ -5267,10 +5524,10 @@
             <a:lstStyle/>
             <a:p>
               <a:r>
-                <a:rPr lang="en-US" altLang="zh-TW" dirty="0" smtClean="0"/>
+                <a:rPr lang="en-US" altLang="zh-TW"/>
                 <a:t>2</a:t>
               </a:r>
-              <a:endParaRPr lang="zh-TW" altLang="en-US" dirty="0"/>
+              <a:endParaRPr lang="zh-TW" altLang="en-US"/>
             </a:p>
           </p:txBody>
         </p:sp>
@@ -5298,10 +5555,10 @@
           <a:lstStyle/>
           <a:p>
             <a:r>
-              <a:rPr lang="en-US" altLang="zh-TW" dirty="0"/>
+              <a:rPr lang="en-US" altLang="zh-TW"/>
               <a:t>7</a:t>
             </a:r>
-            <a:endParaRPr lang="zh-TW" altLang="en-US" dirty="0"/>
+            <a:endParaRPr lang="zh-TW" altLang="en-US"/>
           </a:p>
         </p:txBody>
       </p:sp>
@@ -5374,7 +5631,7 @@
           <a:lstStyle/>
           <a:p>
             <a:r>
-              <a:rPr lang="en-US" altLang="zh-TW" dirty="0" smtClean="0">
+              <a:rPr lang="en-US" altLang="zh-TW">
                 <a:solidFill>
                   <a:schemeClr val="accent6"/>
                 </a:solidFill>
@@ -5382,7 +5639,7 @@
               <a:t>(</a:t>
             </a:r>
             <a:r>
-              <a:rPr lang="zh-TW" altLang="en-US" dirty="0" smtClean="0">
+              <a:rPr lang="zh-TW" altLang="en-US">
                 <a:solidFill>
                   <a:schemeClr val="accent6"/>
                 </a:solidFill>
@@ -5390,7 +5647,7 @@
               <a:t>每人下載</a:t>
             </a:r>
             <a:r>
-              <a:rPr lang="en-US" altLang="zh-TW" dirty="0" smtClean="0">
+              <a:rPr lang="en-US" altLang="zh-TW">
                 <a:solidFill>
                   <a:schemeClr val="accent6"/>
                 </a:solidFill>
@@ -5398,7 +5655,7 @@
               <a:t>10</a:t>
             </a:r>
             <a:r>
-              <a:rPr lang="zh-TW" altLang="en-US" dirty="0" smtClean="0">
+              <a:rPr lang="zh-TW" altLang="en-US">
                 <a:solidFill>
                   <a:schemeClr val="accent6"/>
                 </a:solidFill>
@@ -5406,14 +5663,14 @@
               <a:t>張</a:t>
             </a:r>
             <a:r>
-              <a:rPr lang="en-US" altLang="zh-TW" dirty="0" smtClean="0">
+              <a:rPr lang="en-US" altLang="zh-TW">
                 <a:solidFill>
                   <a:schemeClr val="accent6"/>
                 </a:solidFill>
               </a:rPr>
               <a:t>)</a:t>
             </a:r>
-            <a:endParaRPr lang="zh-TW" altLang="en-US" dirty="0">
+            <a:endParaRPr lang="zh-TW" altLang="en-US">
               <a:solidFill>
                 <a:schemeClr val="accent6"/>
               </a:solidFill>
@@ -5444,7 +5701,7 @@
           <a:lstStyle/>
           <a:p>
             <a:r>
-              <a:rPr lang="en-US" altLang="zh-TW" dirty="0" smtClean="0">
+              <a:rPr lang="en-US" altLang="zh-TW">
                 <a:solidFill>
                   <a:schemeClr val="accent6"/>
                 </a:solidFill>
@@ -5452,7 +5709,7 @@
               <a:t>(</a:t>
             </a:r>
             <a:r>
-              <a:rPr lang="zh-TW" altLang="en-US" dirty="0" smtClean="0">
+              <a:rPr lang="zh-TW" altLang="en-US">
                 <a:solidFill>
                   <a:schemeClr val="accent6"/>
                 </a:solidFill>
@@ -5460,7 +5717,7 @@
               <a:t>每人上傳</a:t>
             </a:r>
             <a:r>
-              <a:rPr lang="en-US" altLang="zh-TW" dirty="0" smtClean="0">
+              <a:rPr lang="en-US" altLang="zh-TW">
                 <a:solidFill>
                   <a:schemeClr val="accent6"/>
                 </a:solidFill>
@@ -5468,7 +5725,7 @@
               <a:t>10</a:t>
             </a:r>
             <a:r>
-              <a:rPr lang="zh-TW" altLang="en-US" dirty="0" smtClean="0">
+              <a:rPr lang="zh-TW" altLang="en-US">
                 <a:solidFill>
                   <a:schemeClr val="accent6"/>
                 </a:solidFill>
@@ -5476,14 +5733,14 @@
               <a:t>組</a:t>
             </a:r>
             <a:r>
-              <a:rPr lang="en-US" altLang="zh-TW" dirty="0" smtClean="0">
+              <a:rPr lang="en-US" altLang="zh-TW">
                 <a:solidFill>
                   <a:schemeClr val="accent6"/>
                 </a:solidFill>
               </a:rPr>
               <a:t>)</a:t>
             </a:r>
-            <a:endParaRPr lang="zh-TW" altLang="en-US" dirty="0">
+            <a:endParaRPr lang="zh-TW" altLang="en-US">
               <a:solidFill>
                 <a:schemeClr val="accent6"/>
               </a:solidFill>
@@ -5514,18 +5771,13 @@
           <a:lstStyle/>
           <a:p>
             <a:r>
-              <a:rPr lang="zh-TW" altLang="en-US" dirty="0" smtClean="0">
+              <a:rPr lang="zh-TW" altLang="en-US">
                 <a:solidFill>
                   <a:schemeClr val="bg1"/>
                 </a:solidFill>
               </a:rPr>
               <a:t>全班學生</a:t>
             </a:r>
-            <a:endParaRPr lang="zh-TW" altLang="en-US" dirty="0">
-              <a:solidFill>
-                <a:schemeClr val="bg1"/>
-              </a:solidFill>
-            </a:endParaRPr>
           </a:p>
         </p:txBody>
       </p:sp>
@@ -5552,7 +5804,7 @@
           <a:lstStyle/>
           <a:p>
             <a:r>
-              <a:rPr lang="zh-TW" altLang="en-US" dirty="0" smtClean="0">
+              <a:rPr lang="zh-TW" altLang="en-US">
                 <a:solidFill>
                   <a:schemeClr val="bg1"/>
                 </a:solidFill>
@@ -5560,14 +5812,14 @@
               <a:t>學生</a:t>
             </a:r>
             <a:r>
-              <a:rPr lang="en-US" altLang="zh-TW" dirty="0" smtClean="0">
+              <a:rPr lang="en-US" altLang="zh-TW">
                 <a:solidFill>
                   <a:schemeClr val="bg1"/>
                 </a:solidFill>
               </a:rPr>
               <a:t>A</a:t>
             </a:r>
-            <a:endParaRPr lang="zh-TW" altLang="en-US" dirty="0">
+            <a:endParaRPr lang="zh-TW" altLang="en-US">
               <a:solidFill>
                 <a:schemeClr val="bg1"/>
               </a:solidFill>
@@ -5598,14 +5850,14 @@
           <a:lstStyle/>
           <a:p>
             <a:r>
-              <a:rPr lang="en-US" altLang="zh-TW" dirty="0" smtClean="0">
+              <a:rPr lang="en-US" altLang="zh-TW">
                 <a:solidFill>
                   <a:schemeClr val="accent6"/>
                 </a:solidFill>
               </a:rPr>
               <a:t>Images , Annotations</a:t>
             </a:r>
-            <a:endParaRPr lang="zh-TW" altLang="en-US" dirty="0">
+            <a:endParaRPr lang="zh-TW" altLang="en-US">
               <a:solidFill>
                 <a:schemeClr val="accent6"/>
               </a:solidFill>
@@ -5636,7 +5888,7 @@
           <a:lstStyle/>
           <a:p>
             <a:r>
-              <a:rPr lang="en-US" altLang="zh-TW" dirty="0" smtClean="0">
+              <a:rPr lang="en-US" altLang="zh-TW">
                 <a:solidFill>
                   <a:schemeClr val="accent6"/>
                 </a:solidFill>
@@ -5644,14 +5896,14 @@
               <a:t>.h5 , </a:t>
             </a:r>
             <a:r>
-              <a:rPr lang="en-US" altLang="zh-TW" dirty="0" err="1" smtClean="0">
+              <a:rPr lang="en-US" altLang="zh-TW" err="1">
                 <a:solidFill>
                   <a:schemeClr val="accent6"/>
                 </a:solidFill>
               </a:rPr>
               <a:t>json</a:t>
             </a:r>
-            <a:endParaRPr lang="zh-TW" altLang="en-US" dirty="0">
+            <a:endParaRPr lang="zh-TW" altLang="en-US">
               <a:solidFill>
                 <a:schemeClr val="accent6"/>
               </a:solidFill>
@@ -5669,13 +5921,6 @@
   <p:clrMapOvr>
     <a:masterClrMapping/>
   </p:clrMapOvr>
-  <p:timing>
-    <p:tnLst>
-      <p:par>
-        <p:cTn id="1" dur="indefinite" restart="never" nodeType="tmRoot"/>
-      </p:par>
-    </p:tnLst>
-  </p:timing>
 </p:sld>
 </file>
 
@@ -5711,29 +5956,123 @@
           <a:bodyPr/>
           <a:lstStyle/>
           <a:p>
-            <a:endParaRPr lang="zh-TW" altLang="en-US"/>
-          </a:p>
-        </p:txBody>
-      </p:sp>
-      <p:sp>
-        <p:nvSpPr>
-          <p:cNvPr id="3" name="內容版面配置區 2"/>
-          <p:cNvSpPr>
-            <a:spLocks noGrp="1"/>
-          </p:cNvSpPr>
-          <p:nvPr>
-            <p:ph idx="1"/>
-          </p:nvPr>
-        </p:nvSpPr>
-        <p:spPr/>
-        <p:txBody>
-          <a:bodyPr/>
+            <a:r>
+              <a:rPr lang="zh-TW" altLang="en-US" dirty="0"/>
+              <a:t>雲端</a:t>
+            </a:r>
+            <a:r>
+              <a:rPr lang="en-US" altLang="zh-TW" dirty="0"/>
+              <a:t>B</a:t>
+            </a:r>
+            <a:r>
+              <a:rPr lang="zh-TW" altLang="en-US" dirty="0"/>
+              <a:t>資料夾準備</a:t>
+            </a:r>
+            <a:r>
+              <a:rPr lang="en-US" altLang="zh-TW" dirty="0"/>
+              <a:t>(</a:t>
+            </a:r>
+            <a:r>
+              <a:rPr lang="zh-TW" altLang="en-US" dirty="0"/>
+              <a:t>學生</a:t>
+            </a:r>
+            <a:r>
+              <a:rPr lang="en-US" altLang="zh-TW" dirty="0"/>
+              <a:t>A)</a:t>
+            </a:r>
+            <a:endParaRPr lang="zh-TW" altLang="en-US" dirty="0"/>
+          </a:p>
+        </p:txBody>
+      </p:sp>
+      <p:sp>
+        <p:nvSpPr>
+          <p:cNvPr id="4" name="文字方塊 3">
+            <a:extLst>
+              <a:ext uri="{FF2B5EF4-FFF2-40B4-BE49-F238E27FC236}">
+                <a16:creationId xmlns:a16="http://schemas.microsoft.com/office/drawing/2014/main" id="{6BF70379-AB66-4497-8D45-BBC6D1039A5D}"/>
+              </a:ext>
+            </a:extLst>
+          </p:cNvPr>
+          <p:cNvSpPr txBox="1"/>
+          <p:nvPr/>
+        </p:nvSpPr>
+        <p:spPr>
+          <a:xfrm>
+            <a:off x="838200" y="1801505"/>
+            <a:ext cx="6168612" cy="369332"/>
+          </a:xfrm>
+          <a:prstGeom prst="rect">
+            <a:avLst/>
+          </a:prstGeom>
+          <a:noFill/>
+        </p:spPr>
+        <p:txBody>
+          <a:bodyPr wrap="none" rtlCol="0">
+            <a:spAutoFit/>
+          </a:bodyPr>
           <a:lstStyle/>
           <a:p>
-            <a:endParaRPr lang="zh-TW" altLang="en-US"/>
-          </a:p>
-        </p:txBody>
-      </p:sp>
+            <a:r>
+              <a:rPr lang="zh-TW" altLang="en-US" dirty="0"/>
+              <a:t>為配合</a:t>
+            </a:r>
+            <a:r>
+              <a:rPr lang="en-US" altLang="zh-TW" dirty="0" err="1"/>
+              <a:t>colab</a:t>
+            </a:r>
+            <a:r>
+              <a:rPr lang="zh-TW" altLang="en-US" dirty="0"/>
+              <a:t>範例</a:t>
+            </a:r>
+            <a:r>
+              <a:rPr lang="en-US" altLang="zh-TW" dirty="0"/>
+              <a:t>” </a:t>
+            </a:r>
+            <a:r>
+              <a:rPr lang="en-US" altLang="zh-TW" dirty="0" err="1"/>
+              <a:t>Vsigns_Train.ipynb</a:t>
+            </a:r>
+            <a:r>
+              <a:rPr lang="en-US" altLang="zh-TW" dirty="0"/>
+              <a:t>”,</a:t>
+            </a:r>
+            <a:r>
+              <a:rPr lang="zh-TW" altLang="en-US" dirty="0"/>
+              <a:t>請準備以下檔案結構</a:t>
+            </a:r>
+          </a:p>
+        </p:txBody>
+      </p:sp>
+      <p:pic>
+        <p:nvPicPr>
+          <p:cNvPr id="6" name="圖片 5">
+            <a:extLst>
+              <a:ext uri="{FF2B5EF4-FFF2-40B4-BE49-F238E27FC236}">
+                <a16:creationId xmlns:a16="http://schemas.microsoft.com/office/drawing/2014/main" id="{4CE93213-B3F2-4A91-82B5-E7AC3ECD5F75}"/>
+              </a:ext>
+            </a:extLst>
+          </p:cNvPr>
+          <p:cNvPicPr>
+            <a:picLocks noChangeAspect="1"/>
+          </p:cNvPicPr>
+          <p:nvPr/>
+        </p:nvPicPr>
+        <p:blipFill>
+          <a:blip r:embed="rId2"/>
+          <a:stretch>
+            <a:fillRect/>
+          </a:stretch>
+        </p:blipFill>
+        <p:spPr>
+          <a:xfrm>
+            <a:off x="838200" y="2473657"/>
+            <a:ext cx="7572375" cy="2838450"/>
+          </a:xfrm>
+          <a:prstGeom prst="rect">
+            <a:avLst/>
+          </a:prstGeom>
+        </p:spPr>
+      </p:pic>
     </p:spTree>
     <p:extLst>
       <p:ext uri="{BB962C8B-B14F-4D97-AF65-F5344CB8AC3E}">
@@ -5744,13 +6083,6 @@
   <p:clrMapOvr>
     <a:masterClrMapping/>
   </p:clrMapOvr>
-  <p:timing>
-    <p:tnLst>
-      <p:par>
-        <p:cTn id="1" dur="indefinite" restart="never" nodeType="tmRoot"/>
-      </p:par>
-    </p:tnLst>
-  </p:timing>
 </p:sld>
 </file>
 
@@ -5786,26 +6118,212 @@
           <a:bodyPr/>
           <a:lstStyle/>
           <a:p>
-            <a:endParaRPr lang="zh-TW" altLang="en-US"/>
-          </a:p>
-        </p:txBody>
-      </p:sp>
-      <p:sp>
-        <p:nvSpPr>
-          <p:cNvPr id="3" name="內容版面配置區 2"/>
-          <p:cNvSpPr>
-            <a:spLocks noGrp="1"/>
-          </p:cNvSpPr>
-          <p:nvPr>
-            <p:ph idx="1"/>
-          </p:nvPr>
-        </p:nvSpPr>
-        <p:spPr/>
-        <p:txBody>
-          <a:bodyPr/>
+            <a:r>
+              <a:rPr lang="zh-TW" altLang="en-US" dirty="0"/>
+              <a:t>樣本製作</a:t>
+            </a:r>
+            <a:r>
+              <a:rPr lang="en-US" altLang="zh-TW" dirty="0"/>
+              <a:t>(</a:t>
+            </a:r>
+            <a:r>
+              <a:rPr lang="zh-TW" altLang="en-US" dirty="0"/>
+              <a:t>全班每人</a:t>
+            </a:r>
+            <a:r>
+              <a:rPr lang="en-US" altLang="zh-TW" dirty="0"/>
+              <a:t>)</a:t>
+            </a:r>
+            <a:endParaRPr lang="zh-TW" altLang="en-US" dirty="0"/>
+          </a:p>
+        </p:txBody>
+      </p:sp>
+      <p:sp>
+        <p:nvSpPr>
+          <p:cNvPr id="6" name="文字方塊 5">
+            <a:extLst>
+              <a:ext uri="{FF2B5EF4-FFF2-40B4-BE49-F238E27FC236}">
+                <a16:creationId xmlns:a16="http://schemas.microsoft.com/office/drawing/2014/main" id="{9D1E8FAB-1B1F-4703-A634-9C5D2D555647}"/>
+              </a:ext>
+            </a:extLst>
+          </p:cNvPr>
+          <p:cNvSpPr txBox="1"/>
+          <p:nvPr/>
+        </p:nvSpPr>
+        <p:spPr>
+          <a:xfrm>
+            <a:off x="838200" y="2139884"/>
+            <a:ext cx="6487032" cy="3416320"/>
+          </a:xfrm>
+          <a:prstGeom prst="rect">
+            <a:avLst/>
+          </a:prstGeom>
+          <a:noFill/>
+        </p:spPr>
+        <p:txBody>
+          <a:bodyPr wrap="none" rtlCol="0">
+            <a:spAutoFit/>
+          </a:bodyPr>
           <a:lstStyle/>
           <a:p>
-            <a:endParaRPr lang="zh-TW" altLang="en-US"/>
+            <a:r>
+              <a:rPr lang="en-US" altLang="zh-TW" dirty="0"/>
+              <a:t>1.</a:t>
+            </a:r>
+            <a:r>
+              <a:rPr lang="zh-TW" altLang="en-US" dirty="0"/>
+              <a:t>準備放置樣本圖片的資料夾</a:t>
+            </a:r>
+            <a:endParaRPr lang="en-US" altLang="zh-TW" dirty="0"/>
+          </a:p>
+          <a:p>
+            <a:r>
+              <a:rPr lang="zh-TW" altLang="en-US" dirty="0"/>
+              <a:t>例如</a:t>
+            </a:r>
+            <a:r>
+              <a:rPr lang="en-US" altLang="zh-TW" dirty="0"/>
+              <a:t>: “c:\samples\”</a:t>
+            </a:r>
+          </a:p>
+          <a:p>
+            <a:endParaRPr lang="en-US" altLang="zh-TW" dirty="0"/>
+          </a:p>
+          <a:p>
+            <a:r>
+              <a:rPr lang="en-US" altLang="zh-TW" dirty="0"/>
+              <a:t>2.</a:t>
+            </a:r>
+            <a:r>
+              <a:rPr lang="zh-TW" altLang="en-US" dirty="0"/>
+              <a:t>將個人負責麼樣本放入</a:t>
+            </a:r>
+            <a:r>
+              <a:rPr lang="en-US" altLang="zh-TW" dirty="0"/>
+              <a:t>“c:\samples\”</a:t>
+            </a:r>
+          </a:p>
+          <a:p>
+            <a:endParaRPr lang="en-US" altLang="zh-TW" dirty="0"/>
+          </a:p>
+          <a:p>
+            <a:r>
+              <a:rPr lang="en-US" altLang="zh-TW" dirty="0"/>
+              <a:t>3.</a:t>
+            </a:r>
+            <a:r>
+              <a:rPr lang="zh-TW" altLang="en-US" dirty="0"/>
+              <a:t>使用</a:t>
+            </a:r>
+            <a:r>
+              <a:rPr lang="en-US" altLang="zh-TW" dirty="0" err="1"/>
+              <a:t>Labelmg</a:t>
+            </a:r>
+            <a:r>
+              <a:rPr lang="zh-TW" altLang="en-US" dirty="0"/>
+              <a:t>製作樣本</a:t>
+            </a:r>
+            <a:endParaRPr lang="en-US" altLang="zh-TW" dirty="0"/>
+          </a:p>
+          <a:p>
+            <a:r>
+              <a:rPr lang="en-US" altLang="zh-TW" dirty="0"/>
+              <a:t>-</a:t>
+            </a:r>
+            <a:r>
+              <a:rPr lang="en-US" altLang="zh-TW" b="0" i="0" u="none" strike="noStrike" dirty="0">
+                <a:effectLst/>
+                <a:latin typeface="Roboto"/>
+                <a:hlinkClick r:id="rId2"/>
+              </a:rPr>
+              <a:t>https://youtu.be/HT4vCF2bM3Y</a:t>
+            </a:r>
+            <a:endParaRPr lang="en-US" altLang="zh-TW" dirty="0"/>
+          </a:p>
+          <a:p>
+            <a:endParaRPr lang="en-US" altLang="zh-TW" dirty="0"/>
+          </a:p>
+          <a:p>
+            <a:r>
+              <a:rPr lang="en-US" altLang="zh-TW" dirty="0"/>
+              <a:t>4.</a:t>
+            </a:r>
+            <a:r>
+              <a:rPr lang="zh-TW" altLang="en-US" dirty="0"/>
+              <a:t>將</a:t>
+            </a:r>
+            <a:r>
+              <a:rPr lang="en-US" altLang="zh-TW" dirty="0"/>
+              <a:t>”c:\samples\”</a:t>
+            </a:r>
+            <a:r>
+              <a:rPr lang="zh-TW" altLang="en-US" dirty="0"/>
+              <a:t>中的圖片和</a:t>
+            </a:r>
+            <a:r>
+              <a:rPr lang="en-US" altLang="zh-TW" dirty="0"/>
+              <a:t>xml</a:t>
+            </a:r>
+            <a:r>
+              <a:rPr lang="zh-TW" altLang="en-US" dirty="0"/>
+              <a:t>檔上傳至雲端</a:t>
+            </a:r>
+            <a:r>
+              <a:rPr lang="en-US" altLang="zh-TW" dirty="0"/>
+              <a:t>B</a:t>
+            </a:r>
+            <a:r>
+              <a:rPr lang="zh-TW" altLang="en-US" dirty="0"/>
+              <a:t>中相對應的位置</a:t>
+            </a:r>
+            <a:endParaRPr lang="en-US" altLang="zh-TW" dirty="0"/>
+          </a:p>
+          <a:p>
+            <a:r>
+              <a:rPr lang="en-US" altLang="zh-TW" dirty="0"/>
+              <a:t>-</a:t>
+            </a:r>
+            <a:r>
+              <a:rPr lang="zh-TW" altLang="en-US" dirty="0"/>
+              <a:t>圖檔放進</a:t>
+            </a:r>
+            <a:r>
+              <a:rPr lang="en-US" altLang="zh-TW" dirty="0"/>
+              <a:t>“</a:t>
+            </a:r>
+            <a:r>
+              <a:rPr lang="en-US" altLang="zh-TW" dirty="0" err="1"/>
+              <a:t>Vsigns_samples</a:t>
+            </a:r>
+            <a:r>
+              <a:rPr lang="en-US" altLang="zh-TW" dirty="0"/>
+              <a:t>\images\train\”</a:t>
+            </a:r>
+          </a:p>
+          <a:p>
+            <a:r>
+              <a:rPr lang="en-US" altLang="zh-TW" dirty="0"/>
+              <a:t>-</a:t>
+            </a:r>
+            <a:r>
+              <a:rPr lang="zh-TW" altLang="en-US" dirty="0"/>
+              <a:t>標籤放進 </a:t>
+            </a:r>
+            <a:r>
+              <a:rPr lang="en-US" altLang="zh-TW" dirty="0"/>
+              <a:t>“</a:t>
+            </a:r>
+            <a:r>
+              <a:rPr lang="en-US" altLang="zh-TW" dirty="0" err="1"/>
+              <a:t>Vsigns_samples</a:t>
+            </a:r>
+            <a:r>
+              <a:rPr lang="en-US" altLang="zh-TW" dirty="0"/>
+              <a:t>\images\annotations\”</a:t>
+            </a:r>
+          </a:p>
+          <a:p>
+            <a:endParaRPr lang="zh-TW" altLang="en-US" dirty="0"/>
           </a:p>
         </p:txBody>
       </p:sp>
@@ -5819,13 +6337,729 @@
   <p:clrMapOvr>
     <a:masterClrMapping/>
   </p:clrMapOvr>
-  <p:timing>
-    <p:tnLst>
-      <p:par>
-        <p:cTn id="1" dur="indefinite" restart="never" nodeType="tmRoot"/>
-      </p:par>
-    </p:tnLst>
-  </p:timing>
+</p:sld>
+</file>
+
+<file path=ppt/slides/slide4.xml><?xml version="1.0" encoding="utf-8"?>
+<p:sld xmlns:a="http://schemas.openxmlformats.org/drawingml/2006/main" xmlns:r="http://schemas.openxmlformats.org/officeDocument/2006/relationships" xmlns:p="http://schemas.openxmlformats.org/presentationml/2006/main">
+  <p:cSld>
+    <p:spTree>
+      <p:nvGrpSpPr>
+        <p:cNvPr id="1" name=""/>
+        <p:cNvGrpSpPr/>
+        <p:nvPr/>
+      </p:nvGrpSpPr>
+      <p:grpSpPr>
+        <a:xfrm>
+          <a:off x="0" y="0"/>
+          <a:ext cx="0" cy="0"/>
+          <a:chOff x="0" y="0"/>
+          <a:chExt cx="0" cy="0"/>
+        </a:xfrm>
+      </p:grpSpPr>
+      <p:sp>
+        <p:nvSpPr>
+          <p:cNvPr id="2" name="標題 1">
+            <a:extLst>
+              <a:ext uri="{FF2B5EF4-FFF2-40B4-BE49-F238E27FC236}">
+                <a16:creationId xmlns:a16="http://schemas.microsoft.com/office/drawing/2014/main" id="{3F3962B0-67E2-47A0-9544-1352F5A01920}"/>
+              </a:ext>
+            </a:extLst>
+          </p:cNvPr>
+          <p:cNvSpPr>
+            <a:spLocks noGrp="1"/>
+          </p:cNvSpPr>
+          <p:nvPr>
+            <p:ph type="title"/>
+          </p:nvPr>
+        </p:nvSpPr>
+        <p:spPr/>
+        <p:txBody>
+          <a:bodyPr/>
+          <a:lstStyle/>
+          <a:p>
+            <a:r>
+              <a:rPr lang="zh-TW" altLang="en-US" dirty="0"/>
+              <a:t>機器學習</a:t>
+            </a:r>
+            <a:r>
+              <a:rPr lang="en-US" altLang="zh-TW" dirty="0"/>
+              <a:t>(</a:t>
+            </a:r>
+            <a:r>
+              <a:rPr lang="zh-TW" altLang="en-US" dirty="0"/>
+              <a:t>學生</a:t>
+            </a:r>
+            <a:r>
+              <a:rPr lang="en-US" altLang="zh-TW" dirty="0"/>
+              <a:t>A)</a:t>
+            </a:r>
+            <a:endParaRPr lang="zh-TW" altLang="en-US" dirty="0"/>
+          </a:p>
+        </p:txBody>
+      </p:sp>
+      <p:sp>
+        <p:nvSpPr>
+          <p:cNvPr id="6" name="文字方塊 5">
+            <a:extLst>
+              <a:ext uri="{FF2B5EF4-FFF2-40B4-BE49-F238E27FC236}">
+                <a16:creationId xmlns:a16="http://schemas.microsoft.com/office/drawing/2014/main" id="{1F1BDA3B-4AFF-43DE-9132-9B447E51B2FC}"/>
+              </a:ext>
+            </a:extLst>
+          </p:cNvPr>
+          <p:cNvSpPr txBox="1"/>
+          <p:nvPr/>
+        </p:nvSpPr>
+        <p:spPr>
+          <a:xfrm>
+            <a:off x="838200" y="2139884"/>
+            <a:ext cx="9999532" cy="1754326"/>
+          </a:xfrm>
+          <a:prstGeom prst="rect">
+            <a:avLst/>
+          </a:prstGeom>
+          <a:noFill/>
+        </p:spPr>
+        <p:txBody>
+          <a:bodyPr wrap="none" rtlCol="0">
+            <a:spAutoFit/>
+          </a:bodyPr>
+          <a:lstStyle/>
+          <a:p>
+            <a:r>
+              <a:rPr lang="en-US" altLang="zh-TW" dirty="0"/>
+              <a:t>1.</a:t>
+            </a:r>
+            <a:r>
+              <a:rPr lang="zh-TW" altLang="en-US" dirty="0"/>
+              <a:t>使用</a:t>
+            </a:r>
+            <a:r>
+              <a:rPr lang="en-US" altLang="zh-TW" dirty="0"/>
+              <a:t>COLAB</a:t>
+            </a:r>
+            <a:r>
+              <a:rPr lang="zh-TW" altLang="en-US" dirty="0"/>
+              <a:t>範例</a:t>
+            </a:r>
+            <a:r>
+              <a:rPr lang="en-US" altLang="zh-TW" dirty="0"/>
+              <a:t>”</a:t>
+            </a:r>
+            <a:r>
+              <a:rPr lang="en-US" altLang="zh-TW" dirty="0" err="1"/>
+              <a:t>Vsigns_Train.ipynb</a:t>
+            </a:r>
+            <a:r>
+              <a:rPr lang="en-US" altLang="zh-TW" dirty="0"/>
+              <a:t>”</a:t>
+            </a:r>
+            <a:r>
+              <a:rPr lang="zh-TW" altLang="en-US" dirty="0"/>
+              <a:t> 製作出網路模型</a:t>
+            </a:r>
+            <a:r>
+              <a:rPr lang="en-US" altLang="zh-TW" dirty="0"/>
+              <a:t>(.h5,json</a:t>
+            </a:r>
+            <a:r>
+              <a:rPr lang="zh-TW" altLang="en-US" dirty="0"/>
+              <a:t>檔</a:t>
+            </a:r>
+            <a:r>
+              <a:rPr lang="en-US" altLang="zh-TW" dirty="0"/>
+              <a:t>)</a:t>
+            </a:r>
+          </a:p>
+          <a:p>
+            <a:r>
+              <a:rPr lang="en-US" altLang="zh-TW" dirty="0"/>
+              <a:t>https://colab.research.google.com/drive/1_a8Sfv29gPjtQQzchd2vIeyTIs810fBb#scrollTo=Ug_eG6HXK6PR</a:t>
+            </a:r>
+            <a:endParaRPr lang="zh-TW" altLang="en-US" dirty="0"/>
+          </a:p>
+          <a:p>
+            <a:endParaRPr lang="en-US" altLang="zh-TW" dirty="0"/>
+          </a:p>
+          <a:p>
+            <a:endParaRPr lang="en-US" altLang="zh-TW" dirty="0"/>
+          </a:p>
+          <a:p>
+            <a:endParaRPr lang="en-US" altLang="zh-TW" dirty="0"/>
+          </a:p>
+          <a:p>
+            <a:r>
+              <a:rPr lang="en-US" altLang="zh-TW" dirty="0"/>
+              <a:t>2.</a:t>
+            </a:r>
+            <a:r>
+              <a:rPr lang="zh-TW" altLang="en-US" dirty="0"/>
+              <a:t>將</a:t>
+            </a:r>
+            <a:r>
+              <a:rPr lang="en-US" altLang="zh-TW" dirty="0"/>
+              <a:t>.h5</a:t>
+            </a:r>
+            <a:r>
+              <a:rPr lang="zh-TW" altLang="en-US" dirty="0"/>
+              <a:t>及</a:t>
+            </a:r>
+            <a:r>
+              <a:rPr lang="en-US" altLang="zh-TW" dirty="0" err="1"/>
+              <a:t>jason</a:t>
+            </a:r>
+            <a:r>
+              <a:rPr lang="zh-TW" altLang="en-US" dirty="0"/>
+              <a:t>檔拷貝到載點雲端位置</a:t>
+            </a:r>
+            <a:r>
+              <a:rPr lang="en-US" altLang="zh-TW" dirty="0"/>
+              <a:t>C</a:t>
+            </a:r>
+            <a:r>
+              <a:rPr lang="zh-TW" altLang="en-US" dirty="0"/>
+              <a:t>供全班同學下載</a:t>
+            </a:r>
+            <a:endParaRPr lang="en-US" altLang="zh-TW" dirty="0"/>
+          </a:p>
+        </p:txBody>
+      </p:sp>
+    </p:spTree>
+    <p:extLst>
+      <p:ext uri="{BB962C8B-B14F-4D97-AF65-F5344CB8AC3E}">
+        <p14:creationId xmlns:p14="http://schemas.microsoft.com/office/powerpoint/2010/main" val="3372900583"/>
+      </p:ext>
+    </p:extLst>
+  </p:cSld>
+  <p:clrMapOvr>
+    <a:masterClrMapping/>
+  </p:clrMapOvr>
+</p:sld>
+</file>
+
+<file path=ppt/slides/slide5.xml><?xml version="1.0" encoding="utf-8"?>
+<p:sld xmlns:a="http://schemas.openxmlformats.org/drawingml/2006/main" xmlns:r="http://schemas.openxmlformats.org/officeDocument/2006/relationships" xmlns:p="http://schemas.openxmlformats.org/presentationml/2006/main">
+  <p:cSld>
+    <p:spTree>
+      <p:nvGrpSpPr>
+        <p:cNvPr id="1" name=""/>
+        <p:cNvGrpSpPr/>
+        <p:nvPr/>
+      </p:nvGrpSpPr>
+      <p:grpSpPr>
+        <a:xfrm>
+          <a:off x="0" y="0"/>
+          <a:ext cx="0" cy="0"/>
+          <a:chOff x="0" y="0"/>
+          <a:chExt cx="0" cy="0"/>
+        </a:xfrm>
+      </p:grpSpPr>
+      <p:sp>
+        <p:nvSpPr>
+          <p:cNvPr id="2" name="標題 1">
+            <a:extLst>
+              <a:ext uri="{FF2B5EF4-FFF2-40B4-BE49-F238E27FC236}">
+                <a16:creationId xmlns:a16="http://schemas.microsoft.com/office/drawing/2014/main" id="{0BF839FF-D4EB-4B94-B8F1-1C9E89718F5C}"/>
+              </a:ext>
+            </a:extLst>
+          </p:cNvPr>
+          <p:cNvSpPr>
+            <a:spLocks noGrp="1"/>
+          </p:cNvSpPr>
+          <p:nvPr>
+            <p:ph type="title"/>
+          </p:nvPr>
+        </p:nvSpPr>
+        <p:spPr/>
+        <p:txBody>
+          <a:bodyPr/>
+          <a:lstStyle/>
+          <a:p>
+            <a:r>
+              <a:rPr lang="zh-TW" altLang="en-US" dirty="0"/>
+              <a:t>猜拳遊戲機</a:t>
+            </a:r>
+            <a:r>
+              <a:rPr lang="en-US" altLang="zh-TW" dirty="0"/>
+              <a:t>(</a:t>
+            </a:r>
+            <a:r>
+              <a:rPr lang="zh-TW" altLang="en-US" dirty="0"/>
+              <a:t>物件偵測實驗</a:t>
+            </a:r>
+            <a:r>
+              <a:rPr lang="en-US" altLang="zh-TW" dirty="0"/>
+              <a:t>)</a:t>
+            </a:r>
+            <a:endParaRPr lang="zh-TW" altLang="en-US" dirty="0"/>
+          </a:p>
+        </p:txBody>
+      </p:sp>
+      <p:sp>
+        <p:nvSpPr>
+          <p:cNvPr id="3" name="內容版面配置區 2">
+            <a:extLst>
+              <a:ext uri="{FF2B5EF4-FFF2-40B4-BE49-F238E27FC236}">
+                <a16:creationId xmlns:a16="http://schemas.microsoft.com/office/drawing/2014/main" id="{90BA72A2-8C20-4B22-9BF7-6745B0569E99}"/>
+              </a:ext>
+            </a:extLst>
+          </p:cNvPr>
+          <p:cNvSpPr>
+            <a:spLocks noGrp="1"/>
+          </p:cNvSpPr>
+          <p:nvPr>
+            <p:ph idx="1"/>
+          </p:nvPr>
+        </p:nvSpPr>
+        <p:spPr/>
+        <p:txBody>
+          <a:bodyPr/>
+          <a:lstStyle/>
+          <a:p>
+            <a:pPr marL="0" indent="0">
+              <a:buNone/>
+            </a:pPr>
+            <a:endParaRPr lang="en-US" altLang="zh-TW" dirty="0"/>
+          </a:p>
+          <a:p>
+            <a:r>
+              <a:rPr lang="en-US" altLang="zh-TW" sz="1400" dirty="0"/>
+              <a:t>python</a:t>
+            </a:r>
+            <a:r>
+              <a:rPr lang="zh-TW" altLang="en-US" sz="1400" dirty="0"/>
+              <a:t>範例下載 </a:t>
+            </a:r>
+            <a:r>
+              <a:rPr lang="en-US" altLang="zh-TW" sz="1400" dirty="0">
+                <a:hlinkClick r:id="rId2"/>
+              </a:rPr>
+              <a:t>https://github.com/NAERSTEAM/YM20200918_RSPImage/releases</a:t>
+            </a:r>
+            <a:endParaRPr lang="en-US" altLang="zh-TW" sz="1400" dirty="0"/>
+          </a:p>
+          <a:p>
+            <a:r>
+              <a:rPr lang="en-US" altLang="zh-TW" sz="1400" dirty="0"/>
+              <a:t>Python</a:t>
+            </a:r>
+            <a:r>
+              <a:rPr lang="zh-TW" altLang="en-US" sz="1400" dirty="0"/>
+              <a:t>範例說明 </a:t>
+            </a:r>
+            <a:r>
+              <a:rPr lang="en-US" altLang="zh-TW" sz="1400" dirty="0">
+                <a:hlinkClick r:id="rId3"/>
+              </a:rPr>
+              <a:t>https://drive.google.com/drive/folders/1kVFgscWPAmCAhqy2JMmVLp6sjVMwnobZ?usp=sharing</a:t>
+            </a:r>
+            <a:endParaRPr lang="en-US" altLang="zh-TW" sz="1400" dirty="0"/>
+          </a:p>
+          <a:p>
+            <a:endParaRPr lang="en-US" altLang="zh-TW" sz="1400" dirty="0"/>
+          </a:p>
+          <a:p>
+            <a:endParaRPr lang="en-US" altLang="zh-TW" dirty="0"/>
+          </a:p>
+          <a:p>
+            <a:endParaRPr lang="en-US" altLang="zh-TW" dirty="0"/>
+          </a:p>
+          <a:p>
+            <a:endParaRPr lang="en-US" altLang="zh-TW" dirty="0"/>
+          </a:p>
+          <a:p>
+            <a:endParaRPr lang="zh-TW" altLang="en-US" dirty="0"/>
+          </a:p>
+        </p:txBody>
+      </p:sp>
+      <p:sp>
+        <p:nvSpPr>
+          <p:cNvPr id="4" name="文字方塊 3">
+            <a:extLst>
+              <a:ext uri="{FF2B5EF4-FFF2-40B4-BE49-F238E27FC236}">
+                <a16:creationId xmlns:a16="http://schemas.microsoft.com/office/drawing/2014/main" id="{FAFA6627-5131-4DF4-8289-D2AC6C464F16}"/>
+              </a:ext>
+            </a:extLst>
+          </p:cNvPr>
+          <p:cNvSpPr txBox="1"/>
+          <p:nvPr/>
+        </p:nvSpPr>
+        <p:spPr>
+          <a:xfrm>
+            <a:off x="838200" y="3429000"/>
+            <a:ext cx="5394105" cy="369332"/>
+          </a:xfrm>
+          <a:prstGeom prst="rect">
+            <a:avLst/>
+          </a:prstGeom>
+          <a:noFill/>
+        </p:spPr>
+        <p:txBody>
+          <a:bodyPr wrap="none" rtlCol="0">
+            <a:spAutoFit/>
+          </a:bodyPr>
+          <a:lstStyle/>
+          <a:p>
+            <a:r>
+              <a:rPr lang="zh-TW" altLang="en-US" dirty="0"/>
+              <a:t>需先安裝</a:t>
+            </a:r>
+            <a:r>
+              <a:rPr lang="en-US" altLang="zh-TW" dirty="0"/>
+              <a:t>Anaconda</a:t>
+            </a:r>
+            <a:r>
+              <a:rPr lang="zh-TW" altLang="en-US" dirty="0"/>
+              <a:t>及設定檔</a:t>
+            </a:r>
+            <a:r>
+              <a:rPr lang="en-US" altLang="zh-TW" dirty="0"/>
+              <a:t>(</a:t>
+            </a:r>
+            <a:r>
+              <a:rPr lang="zh-TW" altLang="en-US" dirty="0"/>
+              <a:t>或其他</a:t>
+            </a:r>
+            <a:r>
+              <a:rPr lang="en-US" altLang="zh-TW" dirty="0"/>
+              <a:t>python</a:t>
+            </a:r>
+            <a:r>
+              <a:rPr lang="zh-TW" altLang="en-US" dirty="0"/>
+              <a:t>開發環境</a:t>
+            </a:r>
+            <a:r>
+              <a:rPr lang="en-US" altLang="zh-TW" dirty="0"/>
+              <a:t>)</a:t>
+            </a:r>
+            <a:endParaRPr lang="zh-TW" altLang="en-US" dirty="0"/>
+          </a:p>
+        </p:txBody>
+      </p:sp>
+    </p:spTree>
+    <p:extLst>
+      <p:ext uri="{BB962C8B-B14F-4D97-AF65-F5344CB8AC3E}">
+        <p14:creationId xmlns:p14="http://schemas.microsoft.com/office/powerpoint/2010/main" val="168721048"/>
+      </p:ext>
+    </p:extLst>
+  </p:cSld>
+  <p:clrMapOvr>
+    <a:masterClrMapping/>
+  </p:clrMapOvr>
+</p:sld>
+</file>
+
+<file path=ppt/slides/slide6.xml><?xml version="1.0" encoding="utf-8"?>
+<p:sld xmlns:a="http://schemas.openxmlformats.org/drawingml/2006/main" xmlns:r="http://schemas.openxmlformats.org/officeDocument/2006/relationships" xmlns:p="http://schemas.openxmlformats.org/presentationml/2006/main">
+  <p:cSld>
+    <p:spTree>
+      <p:nvGrpSpPr>
+        <p:cNvPr id="1" name=""/>
+        <p:cNvGrpSpPr/>
+        <p:nvPr/>
+      </p:nvGrpSpPr>
+      <p:grpSpPr>
+        <a:xfrm>
+          <a:off x="0" y="0"/>
+          <a:ext cx="0" cy="0"/>
+          <a:chOff x="0" y="0"/>
+          <a:chExt cx="0" cy="0"/>
+        </a:xfrm>
+      </p:grpSpPr>
+      <p:sp>
+        <p:nvSpPr>
+          <p:cNvPr id="2" name="標題 1">
+            <a:extLst>
+              <a:ext uri="{FF2B5EF4-FFF2-40B4-BE49-F238E27FC236}">
+                <a16:creationId xmlns:a16="http://schemas.microsoft.com/office/drawing/2014/main" id="{0BF839FF-D4EB-4B94-B8F1-1C9E89718F5C}"/>
+              </a:ext>
+            </a:extLst>
+          </p:cNvPr>
+          <p:cNvSpPr>
+            <a:spLocks noGrp="1"/>
+          </p:cNvSpPr>
+          <p:nvPr>
+            <p:ph type="title"/>
+          </p:nvPr>
+        </p:nvSpPr>
+        <p:spPr/>
+        <p:txBody>
+          <a:bodyPr/>
+          <a:lstStyle/>
+          <a:p>
+            <a:r>
+              <a:rPr lang="en-US" altLang="zh-TW" dirty="0"/>
+              <a:t>Anaconda</a:t>
+            </a:r>
+            <a:endParaRPr lang="zh-TW" altLang="en-US" dirty="0"/>
+          </a:p>
+        </p:txBody>
+      </p:sp>
+      <p:pic>
+        <p:nvPicPr>
+          <p:cNvPr id="5" name="圖片 4">
+            <a:extLst>
+              <a:ext uri="{FF2B5EF4-FFF2-40B4-BE49-F238E27FC236}">
+                <a16:creationId xmlns:a16="http://schemas.microsoft.com/office/drawing/2014/main" id="{22C8CB3C-BDB4-4E39-9FEB-4978704C111B}"/>
+              </a:ext>
+            </a:extLst>
+          </p:cNvPr>
+          <p:cNvPicPr>
+            <a:picLocks noChangeAspect="1"/>
+          </p:cNvPicPr>
+          <p:nvPr/>
+        </p:nvPicPr>
+        <p:blipFill>
+          <a:blip r:embed="rId2"/>
+          <a:stretch>
+            <a:fillRect/>
+          </a:stretch>
+        </p:blipFill>
+        <p:spPr>
+          <a:xfrm>
+            <a:off x="1087846" y="2697286"/>
+            <a:ext cx="2450969" cy="3218969"/>
+          </a:xfrm>
+          <a:prstGeom prst="rect">
+            <a:avLst/>
+          </a:prstGeom>
+        </p:spPr>
+      </p:pic>
+      <p:sp>
+        <p:nvSpPr>
+          <p:cNvPr id="6" name="矩形 5">
+            <a:extLst>
+              <a:ext uri="{FF2B5EF4-FFF2-40B4-BE49-F238E27FC236}">
+                <a16:creationId xmlns:a16="http://schemas.microsoft.com/office/drawing/2014/main" id="{AF32F072-1BFD-4D82-A5CC-91DAB66F679A}"/>
+              </a:ext>
+            </a:extLst>
+          </p:cNvPr>
+          <p:cNvSpPr/>
+          <p:nvPr/>
+        </p:nvSpPr>
+        <p:spPr>
+          <a:xfrm>
+            <a:off x="2916647" y="5439266"/>
+            <a:ext cx="282804" cy="476989"/>
+          </a:xfrm>
+          <a:prstGeom prst="rect">
+            <a:avLst/>
+          </a:prstGeom>
+          <a:noFill/>
+          <a:ln w="38100">
+            <a:solidFill>
+              <a:srgbClr val="FF0000"/>
+            </a:solidFill>
+            <a:prstDash val="sysDash"/>
+          </a:ln>
+        </p:spPr>
+        <p:style>
+          <a:lnRef idx="2">
+            <a:schemeClr val="accent1">
+              <a:shade val="50000"/>
+            </a:schemeClr>
+          </a:lnRef>
+          <a:fillRef idx="1">
+            <a:schemeClr val="accent1"/>
+          </a:fillRef>
+          <a:effectRef idx="0">
+            <a:schemeClr val="accent1"/>
+          </a:effectRef>
+          <a:fontRef idx="minor">
+            <a:schemeClr val="lt1"/>
+          </a:fontRef>
+        </p:style>
+        <p:txBody>
+          <a:bodyPr rtlCol="0" anchor="ctr"/>
+          <a:lstStyle/>
+          <a:p>
+            <a:pPr algn="ctr"/>
+            <a:endParaRPr lang="zh-TW" altLang="en-US"/>
+          </a:p>
+        </p:txBody>
+      </p:sp>
+      <p:sp>
+        <p:nvSpPr>
+          <p:cNvPr id="8" name="矩形 7">
+            <a:extLst>
+              <a:ext uri="{FF2B5EF4-FFF2-40B4-BE49-F238E27FC236}">
+                <a16:creationId xmlns:a16="http://schemas.microsoft.com/office/drawing/2014/main" id="{E043F8CC-07EC-4A2E-A4FB-FB8CC9FCAAB0}"/>
+              </a:ext>
+            </a:extLst>
+          </p:cNvPr>
+          <p:cNvSpPr/>
+          <p:nvPr/>
+        </p:nvSpPr>
+        <p:spPr>
+          <a:xfrm>
+            <a:off x="1121625" y="3290774"/>
+            <a:ext cx="1063657" cy="395107"/>
+          </a:xfrm>
+          <a:prstGeom prst="rect">
+            <a:avLst/>
+          </a:prstGeom>
+          <a:noFill/>
+          <a:ln w="38100">
+            <a:solidFill>
+              <a:srgbClr val="FF0000"/>
+            </a:solidFill>
+            <a:prstDash val="sysDash"/>
+          </a:ln>
+        </p:spPr>
+        <p:style>
+          <a:lnRef idx="2">
+            <a:schemeClr val="accent1">
+              <a:shade val="50000"/>
+            </a:schemeClr>
+          </a:lnRef>
+          <a:fillRef idx="1">
+            <a:schemeClr val="accent1"/>
+          </a:fillRef>
+          <a:effectRef idx="0">
+            <a:schemeClr val="accent1"/>
+          </a:effectRef>
+          <a:fontRef idx="minor">
+            <a:schemeClr val="lt1"/>
+          </a:fontRef>
+        </p:style>
+        <p:txBody>
+          <a:bodyPr rtlCol="0" anchor="ctr"/>
+          <a:lstStyle/>
+          <a:p>
+            <a:pPr algn="ctr"/>
+            <a:endParaRPr lang="zh-TW" altLang="en-US"/>
+          </a:p>
+        </p:txBody>
+      </p:sp>
+      <p:sp>
+        <p:nvSpPr>
+          <p:cNvPr id="9" name="文字方塊 8">
+            <a:extLst>
+              <a:ext uri="{FF2B5EF4-FFF2-40B4-BE49-F238E27FC236}">
+                <a16:creationId xmlns:a16="http://schemas.microsoft.com/office/drawing/2014/main" id="{A7AB7833-C993-4FE8-B975-C536A3D08964}"/>
+              </a:ext>
+            </a:extLst>
+          </p:cNvPr>
+          <p:cNvSpPr txBox="1"/>
+          <p:nvPr/>
+        </p:nvSpPr>
+        <p:spPr>
+          <a:xfrm>
+            <a:off x="1087846" y="1825625"/>
+            <a:ext cx="8722581" cy="646331"/>
+          </a:xfrm>
+          <a:prstGeom prst="rect">
+            <a:avLst/>
+          </a:prstGeom>
+          <a:noFill/>
+        </p:spPr>
+        <p:txBody>
+          <a:bodyPr wrap="none" rtlCol="0">
+            <a:spAutoFit/>
+          </a:bodyPr>
+          <a:lstStyle/>
+          <a:p>
+            <a:r>
+              <a:rPr lang="en-US" altLang="zh-TW" sz="1800" dirty="0"/>
+              <a:t>Anaconda </a:t>
+            </a:r>
+            <a:r>
+              <a:rPr lang="zh-TW" altLang="en-US" sz="1800" dirty="0"/>
+              <a:t>設定檔</a:t>
+            </a:r>
+            <a:r>
+              <a:rPr lang="en-US" altLang="zh-TW" sz="1800" dirty="0"/>
+              <a:t>:</a:t>
+            </a:r>
+            <a:r>
+              <a:rPr lang="zh-TW" altLang="en-US" sz="1800" dirty="0"/>
+              <a:t> </a:t>
+            </a:r>
+            <a:r>
+              <a:rPr lang="en-US" altLang="zh-TW" sz="1800" dirty="0"/>
+              <a:t>“</a:t>
+            </a:r>
+            <a:r>
+              <a:rPr lang="en-US" altLang="zh-TW" sz="1800" dirty="0" err="1"/>
+              <a:t>LabHandSign.yml</a:t>
+            </a:r>
+            <a:r>
+              <a:rPr lang="en-US" altLang="zh-TW" sz="1800" dirty="0"/>
+              <a:t>”</a:t>
+            </a:r>
+          </a:p>
+          <a:p>
+            <a:r>
+              <a:rPr lang="en-US" altLang="zh-TW" sz="1800" dirty="0">
+                <a:hlinkClick r:id="rId3"/>
+              </a:rPr>
+              <a:t>https://drive.google.com/file/d/1Cgu1UUaV25iXKqLpIEuqsgxqfUs6JnWF/view?usp=sharing</a:t>
+            </a:r>
+            <a:endParaRPr lang="en-US" altLang="zh-TW" sz="1800" dirty="0"/>
+          </a:p>
+        </p:txBody>
+      </p:sp>
+      <p:sp>
+        <p:nvSpPr>
+          <p:cNvPr id="10" name="文字方塊 9">
+            <a:extLst>
+              <a:ext uri="{FF2B5EF4-FFF2-40B4-BE49-F238E27FC236}">
+                <a16:creationId xmlns:a16="http://schemas.microsoft.com/office/drawing/2014/main" id="{C8E7604B-94B7-4B79-9111-3045FF725DCE}"/>
+              </a:ext>
+            </a:extLst>
+          </p:cNvPr>
+          <p:cNvSpPr txBox="1"/>
+          <p:nvPr/>
+        </p:nvSpPr>
+        <p:spPr>
+          <a:xfrm>
+            <a:off x="3642511" y="5557935"/>
+            <a:ext cx="3851632" cy="369332"/>
+          </a:xfrm>
+          <a:prstGeom prst="rect">
+            <a:avLst/>
+          </a:prstGeom>
+          <a:noFill/>
+        </p:spPr>
+        <p:txBody>
+          <a:bodyPr wrap="none" rtlCol="0">
+            <a:spAutoFit/>
+          </a:bodyPr>
+          <a:lstStyle/>
+          <a:p>
+            <a:r>
+              <a:rPr lang="zh-TW" altLang="en-US" dirty="0"/>
+              <a:t>安裝完成後</a:t>
+            </a:r>
+            <a:r>
+              <a:rPr lang="en-US" altLang="zh-TW" dirty="0"/>
+              <a:t>,</a:t>
+            </a:r>
+            <a:r>
+              <a:rPr lang="zh-TW" altLang="en-US" dirty="0"/>
+              <a:t>使用</a:t>
+            </a:r>
+            <a:r>
+              <a:rPr lang="en-US" altLang="zh-TW" dirty="0"/>
+              <a:t>”import”</a:t>
+            </a:r>
+            <a:r>
+              <a:rPr lang="zh-TW" altLang="en-US" dirty="0"/>
+              <a:t>載入設定檔</a:t>
+            </a:r>
+          </a:p>
+        </p:txBody>
+      </p:sp>
+    </p:spTree>
+    <p:extLst>
+      <p:ext uri="{BB962C8B-B14F-4D97-AF65-F5344CB8AC3E}">
+        <p14:creationId xmlns:p14="http://schemas.microsoft.com/office/powerpoint/2010/main" val="1996978805"/>
+      </p:ext>
+    </p:extLst>
+  </p:cSld>
+  <p:clrMapOvr>
+    <a:masterClrMapping/>
+  </p:clrMapOvr>
 </p:sld>
 </file>
 

</xml_diff>